<commit_message>
v2 recorde, file, canvas, screen
</commit_message>
<xml_diff>
--- a/RTC MultiConnection/proto/v2.0/RTC API 흐름도.pptx
+++ b/RTC MultiConnection/proto/v2.0/RTC API 흐름도.pptx
@@ -5,8 +5,8 @@
     <p:sldMasterId id="2147483648" r:id="rId1"/>
   </p:sldMasterIdLst>
   <p:sldIdLst>
-    <p:sldId id="256" r:id="rId2"/>
-    <p:sldId id="257" r:id="rId3"/>
+    <p:sldId id="257" r:id="rId2"/>
+    <p:sldId id="256" r:id="rId3"/>
   </p:sldIdLst>
   <p:sldSz cx="12192000" cy="6858000"/>
   <p:notesSz cx="6858000" cy="9144000"/>
@@ -105,6 +105,11 @@
       </a:defRPr>
     </a:lvl9pPr>
   </p:defaultTextStyle>
+  <p:extLst>
+    <p:ext uri="{EFAFB233-063F-42B5-8137-9DF3F51BA10A}">
+      <p15:sldGuideLst xmlns:p15="http://schemas.microsoft.com/office/powerpoint/2012/main"/>
+    </p:ext>
+  </p:extLst>
 </p:presentation>
 </file>
 
@@ -150,10 +155,9 @@
           </a:lstStyle>
           <a:p>
             <a:r>
-              <a:rPr lang="ko-KR" altLang="en-US" smtClean="0"/>
+              <a:rPr lang="ko-KR" altLang="en-US"/>
               <a:t>마스터 제목 스타일 편집</a:t>
             </a:r>
-            <a:endParaRPr lang="ko-KR" altLang="en-US"/>
           </a:p>
         </p:txBody>
       </p:sp>
@@ -215,10 +219,9 @@
           </a:lstStyle>
           <a:p>
             <a:r>
-              <a:rPr lang="ko-KR" altLang="en-US" smtClean="0"/>
+              <a:rPr lang="ko-KR" altLang="en-US"/>
               <a:t>클릭하여 마스터 부제목 스타일 편집</a:t>
             </a:r>
-            <a:endParaRPr lang="ko-KR" altLang="en-US"/>
           </a:p>
         </p:txBody>
       </p:sp>
@@ -239,7 +242,7 @@
           <a:p>
             <a:fld id="{03C0471A-D7D7-4A12-A6D4-8D274DE1A250}" type="datetimeFigureOut">
               <a:rPr lang="ko-KR" altLang="en-US" smtClean="0"/>
-              <a:t>2019-04-28</a:t>
+              <a:t>2019-04-29</a:t>
             </a:fld>
             <a:endParaRPr lang="ko-KR" altLang="en-US"/>
           </a:p>
@@ -333,10 +336,9 @@
           <a:lstStyle/>
           <a:p>
             <a:r>
-              <a:rPr lang="ko-KR" altLang="en-US" smtClean="0"/>
+              <a:rPr lang="ko-KR" altLang="en-US"/>
               <a:t>마스터 제목 스타일 편집</a:t>
             </a:r>
-            <a:endParaRPr lang="ko-KR" altLang="en-US"/>
           </a:p>
         </p:txBody>
       </p:sp>
@@ -357,38 +359,37 @@
           <a:p>
             <a:pPr lvl="0"/>
             <a:r>
-              <a:rPr lang="ko-KR" altLang="en-US" smtClean="0"/>
+              <a:rPr lang="ko-KR" altLang="en-US"/>
               <a:t>마스터 텍스트 스타일 편집</a:t>
             </a:r>
           </a:p>
           <a:p>
             <a:pPr lvl="1"/>
             <a:r>
-              <a:rPr lang="ko-KR" altLang="en-US" smtClean="0"/>
+              <a:rPr lang="ko-KR" altLang="en-US"/>
               <a:t>둘째 수준</a:t>
             </a:r>
           </a:p>
           <a:p>
             <a:pPr lvl="2"/>
             <a:r>
-              <a:rPr lang="ko-KR" altLang="en-US" smtClean="0"/>
+              <a:rPr lang="ko-KR" altLang="en-US"/>
               <a:t>셋째 수준</a:t>
             </a:r>
           </a:p>
           <a:p>
             <a:pPr lvl="3"/>
             <a:r>
-              <a:rPr lang="ko-KR" altLang="en-US" smtClean="0"/>
+              <a:rPr lang="ko-KR" altLang="en-US"/>
               <a:t>넷째 수준</a:t>
             </a:r>
           </a:p>
           <a:p>
             <a:pPr lvl="4"/>
             <a:r>
-              <a:rPr lang="ko-KR" altLang="en-US" smtClean="0"/>
+              <a:rPr lang="ko-KR" altLang="en-US"/>
               <a:t>다섯째 수준</a:t>
             </a:r>
-            <a:endParaRPr lang="ko-KR" altLang="en-US"/>
           </a:p>
         </p:txBody>
       </p:sp>
@@ -409,7 +410,7 @@
           <a:p>
             <a:fld id="{03C0471A-D7D7-4A12-A6D4-8D274DE1A250}" type="datetimeFigureOut">
               <a:rPr lang="ko-KR" altLang="en-US" smtClean="0"/>
-              <a:t>2019-04-28</a:t>
+              <a:t>2019-04-29</a:t>
             </a:fld>
             <a:endParaRPr lang="ko-KR" altLang="en-US"/>
           </a:p>
@@ -508,10 +509,9 @@
           <a:lstStyle/>
           <a:p>
             <a:r>
-              <a:rPr lang="ko-KR" altLang="en-US" smtClean="0"/>
+              <a:rPr lang="ko-KR" altLang="en-US"/>
               <a:t>마스터 제목 스타일 편집</a:t>
             </a:r>
-            <a:endParaRPr lang="ko-KR" altLang="en-US"/>
           </a:p>
         </p:txBody>
       </p:sp>
@@ -537,38 +537,37 @@
           <a:p>
             <a:pPr lvl="0"/>
             <a:r>
-              <a:rPr lang="ko-KR" altLang="en-US" smtClean="0"/>
+              <a:rPr lang="ko-KR" altLang="en-US"/>
               <a:t>마스터 텍스트 스타일 편집</a:t>
             </a:r>
           </a:p>
           <a:p>
             <a:pPr lvl="1"/>
             <a:r>
-              <a:rPr lang="ko-KR" altLang="en-US" smtClean="0"/>
+              <a:rPr lang="ko-KR" altLang="en-US"/>
               <a:t>둘째 수준</a:t>
             </a:r>
           </a:p>
           <a:p>
             <a:pPr lvl="2"/>
             <a:r>
-              <a:rPr lang="ko-KR" altLang="en-US" smtClean="0"/>
+              <a:rPr lang="ko-KR" altLang="en-US"/>
               <a:t>셋째 수준</a:t>
             </a:r>
           </a:p>
           <a:p>
             <a:pPr lvl="3"/>
             <a:r>
-              <a:rPr lang="ko-KR" altLang="en-US" smtClean="0"/>
+              <a:rPr lang="ko-KR" altLang="en-US"/>
               <a:t>넷째 수준</a:t>
             </a:r>
           </a:p>
           <a:p>
             <a:pPr lvl="4"/>
             <a:r>
-              <a:rPr lang="ko-KR" altLang="en-US" smtClean="0"/>
+              <a:rPr lang="ko-KR" altLang="en-US"/>
               <a:t>다섯째 수준</a:t>
             </a:r>
-            <a:endParaRPr lang="ko-KR" altLang="en-US"/>
           </a:p>
         </p:txBody>
       </p:sp>
@@ -589,7 +588,7 @@
           <a:p>
             <a:fld id="{03C0471A-D7D7-4A12-A6D4-8D274DE1A250}" type="datetimeFigureOut">
               <a:rPr lang="ko-KR" altLang="en-US" smtClean="0"/>
-              <a:t>2019-04-28</a:t>
+              <a:t>2019-04-29</a:t>
             </a:fld>
             <a:endParaRPr lang="ko-KR" altLang="en-US"/>
           </a:p>
@@ -683,10 +682,9 @@
           <a:lstStyle/>
           <a:p>
             <a:r>
-              <a:rPr lang="ko-KR" altLang="en-US" smtClean="0"/>
+              <a:rPr lang="ko-KR" altLang="en-US"/>
               <a:t>마스터 제목 스타일 편집</a:t>
             </a:r>
-            <a:endParaRPr lang="ko-KR" altLang="en-US"/>
           </a:p>
         </p:txBody>
       </p:sp>
@@ -707,38 +705,37 @@
           <a:p>
             <a:pPr lvl="0"/>
             <a:r>
-              <a:rPr lang="ko-KR" altLang="en-US" smtClean="0"/>
+              <a:rPr lang="ko-KR" altLang="en-US"/>
               <a:t>마스터 텍스트 스타일 편집</a:t>
             </a:r>
           </a:p>
           <a:p>
             <a:pPr lvl="1"/>
             <a:r>
-              <a:rPr lang="ko-KR" altLang="en-US" smtClean="0"/>
+              <a:rPr lang="ko-KR" altLang="en-US"/>
               <a:t>둘째 수준</a:t>
             </a:r>
           </a:p>
           <a:p>
             <a:pPr lvl="2"/>
             <a:r>
-              <a:rPr lang="ko-KR" altLang="en-US" smtClean="0"/>
+              <a:rPr lang="ko-KR" altLang="en-US"/>
               <a:t>셋째 수준</a:t>
             </a:r>
           </a:p>
           <a:p>
             <a:pPr lvl="3"/>
             <a:r>
-              <a:rPr lang="ko-KR" altLang="en-US" smtClean="0"/>
+              <a:rPr lang="ko-KR" altLang="en-US"/>
               <a:t>넷째 수준</a:t>
             </a:r>
           </a:p>
           <a:p>
             <a:pPr lvl="4"/>
             <a:r>
-              <a:rPr lang="ko-KR" altLang="en-US" smtClean="0"/>
+              <a:rPr lang="ko-KR" altLang="en-US"/>
               <a:t>다섯째 수준</a:t>
             </a:r>
-            <a:endParaRPr lang="ko-KR" altLang="en-US"/>
           </a:p>
         </p:txBody>
       </p:sp>
@@ -759,7 +756,7 @@
           <a:p>
             <a:fld id="{03C0471A-D7D7-4A12-A6D4-8D274DE1A250}" type="datetimeFigureOut">
               <a:rPr lang="ko-KR" altLang="en-US" smtClean="0"/>
-              <a:t>2019-04-28</a:t>
+              <a:t>2019-04-29</a:t>
             </a:fld>
             <a:endParaRPr lang="ko-KR" altLang="en-US"/>
           </a:p>
@@ -862,10 +859,9 @@
           </a:lstStyle>
           <a:p>
             <a:r>
-              <a:rPr lang="ko-KR" altLang="en-US" smtClean="0"/>
+              <a:rPr lang="ko-KR" altLang="en-US"/>
               <a:t>마스터 제목 스타일 편집</a:t>
             </a:r>
-            <a:endParaRPr lang="ko-KR" altLang="en-US"/>
           </a:p>
         </p:txBody>
       </p:sp>
@@ -982,7 +978,7 @@
           <a:p>
             <a:pPr lvl="0"/>
             <a:r>
-              <a:rPr lang="ko-KR" altLang="en-US" smtClean="0"/>
+              <a:rPr lang="ko-KR" altLang="en-US"/>
               <a:t>마스터 텍스트 스타일 편집</a:t>
             </a:r>
           </a:p>
@@ -1005,7 +1001,7 @@
           <a:p>
             <a:fld id="{03C0471A-D7D7-4A12-A6D4-8D274DE1A250}" type="datetimeFigureOut">
               <a:rPr lang="ko-KR" altLang="en-US" smtClean="0"/>
-              <a:t>2019-04-28</a:t>
+              <a:t>2019-04-29</a:t>
             </a:fld>
             <a:endParaRPr lang="ko-KR" altLang="en-US"/>
           </a:p>
@@ -1099,10 +1095,9 @@
           <a:lstStyle/>
           <a:p>
             <a:r>
-              <a:rPr lang="ko-KR" altLang="en-US" smtClean="0"/>
+              <a:rPr lang="ko-KR" altLang="en-US"/>
               <a:t>마스터 제목 스타일 편집</a:t>
             </a:r>
-            <a:endParaRPr lang="ko-KR" altLang="en-US"/>
           </a:p>
         </p:txBody>
       </p:sp>
@@ -1128,38 +1123,37 @@
           <a:p>
             <a:pPr lvl="0"/>
             <a:r>
-              <a:rPr lang="ko-KR" altLang="en-US" smtClean="0"/>
+              <a:rPr lang="ko-KR" altLang="en-US"/>
               <a:t>마스터 텍스트 스타일 편집</a:t>
             </a:r>
           </a:p>
           <a:p>
             <a:pPr lvl="1"/>
             <a:r>
-              <a:rPr lang="ko-KR" altLang="en-US" smtClean="0"/>
+              <a:rPr lang="ko-KR" altLang="en-US"/>
               <a:t>둘째 수준</a:t>
             </a:r>
           </a:p>
           <a:p>
             <a:pPr lvl="2"/>
             <a:r>
-              <a:rPr lang="ko-KR" altLang="en-US" smtClean="0"/>
+              <a:rPr lang="ko-KR" altLang="en-US"/>
               <a:t>셋째 수준</a:t>
             </a:r>
           </a:p>
           <a:p>
             <a:pPr lvl="3"/>
             <a:r>
-              <a:rPr lang="ko-KR" altLang="en-US" smtClean="0"/>
+              <a:rPr lang="ko-KR" altLang="en-US"/>
               <a:t>넷째 수준</a:t>
             </a:r>
           </a:p>
           <a:p>
             <a:pPr lvl="4"/>
             <a:r>
-              <a:rPr lang="ko-KR" altLang="en-US" smtClean="0"/>
+              <a:rPr lang="ko-KR" altLang="en-US"/>
               <a:t>다섯째 수준</a:t>
             </a:r>
-            <a:endParaRPr lang="ko-KR" altLang="en-US"/>
           </a:p>
         </p:txBody>
       </p:sp>
@@ -1185,38 +1179,37 @@
           <a:p>
             <a:pPr lvl="0"/>
             <a:r>
-              <a:rPr lang="ko-KR" altLang="en-US" smtClean="0"/>
+              <a:rPr lang="ko-KR" altLang="en-US"/>
               <a:t>마스터 텍스트 스타일 편집</a:t>
             </a:r>
           </a:p>
           <a:p>
             <a:pPr lvl="1"/>
             <a:r>
-              <a:rPr lang="ko-KR" altLang="en-US" smtClean="0"/>
+              <a:rPr lang="ko-KR" altLang="en-US"/>
               <a:t>둘째 수준</a:t>
             </a:r>
           </a:p>
           <a:p>
             <a:pPr lvl="2"/>
             <a:r>
-              <a:rPr lang="ko-KR" altLang="en-US" smtClean="0"/>
+              <a:rPr lang="ko-KR" altLang="en-US"/>
               <a:t>셋째 수준</a:t>
             </a:r>
           </a:p>
           <a:p>
             <a:pPr lvl="3"/>
             <a:r>
-              <a:rPr lang="ko-KR" altLang="en-US" smtClean="0"/>
+              <a:rPr lang="ko-KR" altLang="en-US"/>
               <a:t>넷째 수준</a:t>
             </a:r>
           </a:p>
           <a:p>
             <a:pPr lvl="4"/>
             <a:r>
-              <a:rPr lang="ko-KR" altLang="en-US" smtClean="0"/>
+              <a:rPr lang="ko-KR" altLang="en-US"/>
               <a:t>다섯째 수준</a:t>
             </a:r>
-            <a:endParaRPr lang="ko-KR" altLang="en-US"/>
           </a:p>
         </p:txBody>
       </p:sp>
@@ -1237,7 +1230,7 @@
           <a:p>
             <a:fld id="{03C0471A-D7D7-4A12-A6D4-8D274DE1A250}" type="datetimeFigureOut">
               <a:rPr lang="ko-KR" altLang="en-US" smtClean="0"/>
-              <a:t>2019-04-28</a:t>
+              <a:t>2019-04-29</a:t>
             </a:fld>
             <a:endParaRPr lang="ko-KR" altLang="en-US"/>
           </a:p>
@@ -1336,10 +1329,9 @@
           <a:lstStyle/>
           <a:p>
             <a:r>
-              <a:rPr lang="ko-KR" altLang="en-US" smtClean="0"/>
+              <a:rPr lang="ko-KR" altLang="en-US"/>
               <a:t>마스터 제목 스타일 편집</a:t>
             </a:r>
-            <a:endParaRPr lang="ko-KR" altLang="en-US"/>
           </a:p>
         </p:txBody>
       </p:sp>
@@ -1402,7 +1394,7 @@
           <a:p>
             <a:pPr lvl="0"/>
             <a:r>
-              <a:rPr lang="ko-KR" altLang="en-US" smtClean="0"/>
+              <a:rPr lang="ko-KR" altLang="en-US"/>
               <a:t>마스터 텍스트 스타일 편집</a:t>
             </a:r>
           </a:p>
@@ -1430,38 +1422,37 @@
           <a:p>
             <a:pPr lvl="0"/>
             <a:r>
-              <a:rPr lang="ko-KR" altLang="en-US" smtClean="0"/>
+              <a:rPr lang="ko-KR" altLang="en-US"/>
               <a:t>마스터 텍스트 스타일 편집</a:t>
             </a:r>
           </a:p>
           <a:p>
             <a:pPr lvl="1"/>
             <a:r>
-              <a:rPr lang="ko-KR" altLang="en-US" smtClean="0"/>
+              <a:rPr lang="ko-KR" altLang="en-US"/>
               <a:t>둘째 수준</a:t>
             </a:r>
           </a:p>
           <a:p>
             <a:pPr lvl="2"/>
             <a:r>
-              <a:rPr lang="ko-KR" altLang="en-US" smtClean="0"/>
+              <a:rPr lang="ko-KR" altLang="en-US"/>
               <a:t>셋째 수준</a:t>
             </a:r>
           </a:p>
           <a:p>
             <a:pPr lvl="3"/>
             <a:r>
-              <a:rPr lang="ko-KR" altLang="en-US" smtClean="0"/>
+              <a:rPr lang="ko-KR" altLang="en-US"/>
               <a:t>넷째 수준</a:t>
             </a:r>
           </a:p>
           <a:p>
             <a:pPr lvl="4"/>
             <a:r>
-              <a:rPr lang="ko-KR" altLang="en-US" smtClean="0"/>
+              <a:rPr lang="ko-KR" altLang="en-US"/>
               <a:t>다섯째 수준</a:t>
             </a:r>
-            <a:endParaRPr lang="ko-KR" altLang="en-US"/>
           </a:p>
         </p:txBody>
       </p:sp>
@@ -1524,7 +1515,7 @@
           <a:p>
             <a:pPr lvl="0"/>
             <a:r>
-              <a:rPr lang="ko-KR" altLang="en-US" smtClean="0"/>
+              <a:rPr lang="ko-KR" altLang="en-US"/>
               <a:t>마스터 텍스트 스타일 편집</a:t>
             </a:r>
           </a:p>
@@ -1552,38 +1543,37 @@
           <a:p>
             <a:pPr lvl="0"/>
             <a:r>
-              <a:rPr lang="ko-KR" altLang="en-US" smtClean="0"/>
+              <a:rPr lang="ko-KR" altLang="en-US"/>
               <a:t>마스터 텍스트 스타일 편집</a:t>
             </a:r>
           </a:p>
           <a:p>
             <a:pPr lvl="1"/>
             <a:r>
-              <a:rPr lang="ko-KR" altLang="en-US" smtClean="0"/>
+              <a:rPr lang="ko-KR" altLang="en-US"/>
               <a:t>둘째 수준</a:t>
             </a:r>
           </a:p>
           <a:p>
             <a:pPr lvl="2"/>
             <a:r>
-              <a:rPr lang="ko-KR" altLang="en-US" smtClean="0"/>
+              <a:rPr lang="ko-KR" altLang="en-US"/>
               <a:t>셋째 수준</a:t>
             </a:r>
           </a:p>
           <a:p>
             <a:pPr lvl="3"/>
             <a:r>
-              <a:rPr lang="ko-KR" altLang="en-US" smtClean="0"/>
+              <a:rPr lang="ko-KR" altLang="en-US"/>
               <a:t>넷째 수준</a:t>
             </a:r>
           </a:p>
           <a:p>
             <a:pPr lvl="4"/>
             <a:r>
-              <a:rPr lang="ko-KR" altLang="en-US" smtClean="0"/>
+              <a:rPr lang="ko-KR" altLang="en-US"/>
               <a:t>다섯째 수준</a:t>
             </a:r>
-            <a:endParaRPr lang="ko-KR" altLang="en-US"/>
           </a:p>
         </p:txBody>
       </p:sp>
@@ -1604,7 +1594,7 @@
           <a:p>
             <a:fld id="{03C0471A-D7D7-4A12-A6D4-8D274DE1A250}" type="datetimeFigureOut">
               <a:rPr lang="ko-KR" altLang="en-US" smtClean="0"/>
-              <a:t>2019-04-28</a:t>
+              <a:t>2019-04-29</a:t>
             </a:fld>
             <a:endParaRPr lang="ko-KR" altLang="en-US"/>
           </a:p>
@@ -1698,10 +1688,9 @@
           <a:lstStyle/>
           <a:p>
             <a:r>
-              <a:rPr lang="ko-KR" altLang="en-US" smtClean="0"/>
+              <a:rPr lang="ko-KR" altLang="en-US"/>
               <a:t>마스터 제목 스타일 편집</a:t>
             </a:r>
-            <a:endParaRPr lang="ko-KR" altLang="en-US"/>
           </a:p>
         </p:txBody>
       </p:sp>
@@ -1722,7 +1711,7 @@
           <a:p>
             <a:fld id="{03C0471A-D7D7-4A12-A6D4-8D274DE1A250}" type="datetimeFigureOut">
               <a:rPr lang="ko-KR" altLang="en-US" smtClean="0"/>
-              <a:t>2019-04-28</a:t>
+              <a:t>2019-04-29</a:t>
             </a:fld>
             <a:endParaRPr lang="ko-KR" altLang="en-US"/>
           </a:p>
@@ -1817,7 +1806,7 @@
           <a:p>
             <a:fld id="{03C0471A-D7D7-4A12-A6D4-8D274DE1A250}" type="datetimeFigureOut">
               <a:rPr lang="ko-KR" altLang="en-US" smtClean="0"/>
-              <a:t>2019-04-28</a:t>
+              <a:t>2019-04-29</a:t>
             </a:fld>
             <a:endParaRPr lang="ko-KR" altLang="en-US"/>
           </a:p>
@@ -1920,10 +1909,9 @@
           </a:lstStyle>
           <a:p>
             <a:r>
-              <a:rPr lang="ko-KR" altLang="en-US" smtClean="0"/>
+              <a:rPr lang="ko-KR" altLang="en-US"/>
               <a:t>마스터 제목 스타일 편집</a:t>
             </a:r>
-            <a:endParaRPr lang="ko-KR" altLang="en-US"/>
           </a:p>
         </p:txBody>
       </p:sp>
@@ -1977,38 +1965,37 @@
           <a:p>
             <a:pPr lvl="0"/>
             <a:r>
-              <a:rPr lang="ko-KR" altLang="en-US" smtClean="0"/>
+              <a:rPr lang="ko-KR" altLang="en-US"/>
               <a:t>마스터 텍스트 스타일 편집</a:t>
             </a:r>
           </a:p>
           <a:p>
             <a:pPr lvl="1"/>
             <a:r>
-              <a:rPr lang="ko-KR" altLang="en-US" smtClean="0"/>
+              <a:rPr lang="ko-KR" altLang="en-US"/>
               <a:t>둘째 수준</a:t>
             </a:r>
           </a:p>
           <a:p>
             <a:pPr lvl="2"/>
             <a:r>
-              <a:rPr lang="ko-KR" altLang="en-US" smtClean="0"/>
+              <a:rPr lang="ko-KR" altLang="en-US"/>
               <a:t>셋째 수준</a:t>
             </a:r>
           </a:p>
           <a:p>
             <a:pPr lvl="3"/>
             <a:r>
-              <a:rPr lang="ko-KR" altLang="en-US" smtClean="0"/>
+              <a:rPr lang="ko-KR" altLang="en-US"/>
               <a:t>넷째 수준</a:t>
             </a:r>
           </a:p>
           <a:p>
             <a:pPr lvl="4"/>
             <a:r>
-              <a:rPr lang="ko-KR" altLang="en-US" smtClean="0"/>
+              <a:rPr lang="ko-KR" altLang="en-US"/>
               <a:t>다섯째 수준</a:t>
             </a:r>
-            <a:endParaRPr lang="ko-KR" altLang="en-US"/>
           </a:p>
         </p:txBody>
       </p:sp>
@@ -2071,7 +2058,7 @@
           <a:p>
             <a:pPr lvl="0"/>
             <a:r>
-              <a:rPr lang="ko-KR" altLang="en-US" smtClean="0"/>
+              <a:rPr lang="ko-KR" altLang="en-US"/>
               <a:t>마스터 텍스트 스타일 편집</a:t>
             </a:r>
           </a:p>
@@ -2094,7 +2081,7 @@
           <a:p>
             <a:fld id="{03C0471A-D7D7-4A12-A6D4-8D274DE1A250}" type="datetimeFigureOut">
               <a:rPr lang="ko-KR" altLang="en-US" smtClean="0"/>
-              <a:t>2019-04-28</a:t>
+              <a:t>2019-04-29</a:t>
             </a:fld>
             <a:endParaRPr lang="ko-KR" altLang="en-US"/>
           </a:p>
@@ -2197,10 +2184,9 @@
           </a:lstStyle>
           <a:p>
             <a:r>
-              <a:rPr lang="ko-KR" altLang="en-US" smtClean="0"/>
+              <a:rPr lang="ko-KR" altLang="en-US"/>
               <a:t>마스터 제목 스타일 편집</a:t>
             </a:r>
-            <a:endParaRPr lang="ko-KR" altLang="en-US"/>
           </a:p>
         </p:txBody>
       </p:sp>
@@ -2324,7 +2310,7 @@
           <a:p>
             <a:pPr lvl="0"/>
             <a:r>
-              <a:rPr lang="ko-KR" altLang="en-US" smtClean="0"/>
+              <a:rPr lang="ko-KR" altLang="en-US"/>
               <a:t>마스터 텍스트 스타일 편집</a:t>
             </a:r>
           </a:p>
@@ -2347,7 +2333,7 @@
           <a:p>
             <a:fld id="{03C0471A-D7D7-4A12-A6D4-8D274DE1A250}" type="datetimeFigureOut">
               <a:rPr lang="ko-KR" altLang="en-US" smtClean="0"/>
-              <a:t>2019-04-28</a:t>
+              <a:t>2019-04-29</a:t>
             </a:fld>
             <a:endParaRPr lang="ko-KR" altLang="en-US"/>
           </a:p>
@@ -2456,10 +2442,9 @@
           <a:lstStyle/>
           <a:p>
             <a:r>
-              <a:rPr lang="ko-KR" altLang="en-US" smtClean="0"/>
+              <a:rPr lang="ko-KR" altLang="en-US"/>
               <a:t>마스터 제목 스타일 편집</a:t>
             </a:r>
-            <a:endParaRPr lang="ko-KR" altLang="en-US"/>
           </a:p>
         </p:txBody>
       </p:sp>
@@ -2490,38 +2475,37 @@
           <a:p>
             <a:pPr lvl="0"/>
             <a:r>
-              <a:rPr lang="ko-KR" altLang="en-US" smtClean="0"/>
+              <a:rPr lang="ko-KR" altLang="en-US"/>
               <a:t>마스터 텍스트 스타일 편집</a:t>
             </a:r>
           </a:p>
           <a:p>
             <a:pPr lvl="1"/>
             <a:r>
-              <a:rPr lang="ko-KR" altLang="en-US" smtClean="0"/>
+              <a:rPr lang="ko-KR" altLang="en-US"/>
               <a:t>둘째 수준</a:t>
             </a:r>
           </a:p>
           <a:p>
             <a:pPr lvl="2"/>
             <a:r>
-              <a:rPr lang="ko-KR" altLang="en-US" smtClean="0"/>
+              <a:rPr lang="ko-KR" altLang="en-US"/>
               <a:t>셋째 수준</a:t>
             </a:r>
           </a:p>
           <a:p>
             <a:pPr lvl="3"/>
             <a:r>
-              <a:rPr lang="ko-KR" altLang="en-US" smtClean="0"/>
+              <a:rPr lang="ko-KR" altLang="en-US"/>
               <a:t>넷째 수준</a:t>
             </a:r>
           </a:p>
           <a:p>
             <a:pPr lvl="4"/>
             <a:r>
-              <a:rPr lang="ko-KR" altLang="en-US" smtClean="0"/>
+              <a:rPr lang="ko-KR" altLang="en-US"/>
               <a:t>다섯째 수준</a:t>
             </a:r>
-            <a:endParaRPr lang="ko-KR" altLang="en-US"/>
           </a:p>
         </p:txBody>
       </p:sp>
@@ -2560,7 +2544,7 @@
           <a:p>
             <a:fld id="{03C0471A-D7D7-4A12-A6D4-8D274DE1A250}" type="datetimeFigureOut">
               <a:rPr lang="ko-KR" altLang="en-US" smtClean="0"/>
-              <a:t>2019-04-28</a:t>
+              <a:t>2019-04-29</a:t>
             </a:fld>
             <a:endParaRPr lang="ko-KR" altLang="en-US"/>
           </a:p>
@@ -2967,638 +2951,6 @@
       </p:grpSpPr>
       <p:sp>
         <p:nvSpPr>
-          <p:cNvPr id="5" name="직사각형 4"/>
-          <p:cNvSpPr/>
-          <p:nvPr/>
-        </p:nvSpPr>
-        <p:spPr>
-          <a:xfrm>
-            <a:off x="93785" y="630018"/>
-            <a:ext cx="5032131" cy="3970318"/>
-          </a:xfrm>
-          <a:prstGeom prst="rect">
-            <a:avLst/>
-          </a:prstGeom>
-        </p:spPr>
-        <p:txBody>
-          <a:bodyPr wrap="square">
-            <a:spAutoFit/>
-          </a:bodyPr>
-          <a:lstStyle/>
-          <a:p>
-            <a:r>
-              <a:rPr lang="ko-KR" altLang="en-US" dirty="0" err="1" smtClean="0"/>
-              <a:t>rtc.conn</a:t>
-            </a:r>
-            <a:r>
-              <a:rPr lang="ko-KR" altLang="en-US" dirty="0" smtClean="0"/>
-              <a:t> = {};</a:t>
-            </a:r>
-          </a:p>
-          <a:p>
-            <a:r>
-              <a:rPr lang="ko-KR" altLang="en-US" dirty="0" err="1" smtClean="0"/>
-              <a:t>rtc.enables</a:t>
-            </a:r>
-            <a:r>
-              <a:rPr lang="ko-KR" altLang="en-US" dirty="0" smtClean="0"/>
-              <a:t> = {};</a:t>
-            </a:r>
-          </a:p>
-          <a:p>
-            <a:r>
-              <a:rPr lang="ko-KR" altLang="en-US" dirty="0" err="1" smtClean="0"/>
-              <a:t>rtc.streams</a:t>
-            </a:r>
-            <a:r>
-              <a:rPr lang="ko-KR" altLang="en-US" dirty="0" smtClean="0"/>
-              <a:t> = {};</a:t>
-            </a:r>
-          </a:p>
-          <a:p>
-            <a:r>
-              <a:rPr lang="ko-KR" altLang="en-US" dirty="0" err="1" smtClean="0"/>
-              <a:t>rtc.resolutionSelect</a:t>
-            </a:r>
-            <a:r>
-              <a:rPr lang="ko-KR" altLang="en-US" dirty="0" smtClean="0"/>
-              <a:t> = {};</a:t>
-            </a:r>
-          </a:p>
-          <a:p>
-            <a:r>
-              <a:rPr lang="ko-KR" altLang="en-US" dirty="0" err="1" smtClean="0"/>
-              <a:t>rtc.deviceSelect</a:t>
-            </a:r>
-            <a:r>
-              <a:rPr lang="ko-KR" altLang="en-US" dirty="0" smtClean="0"/>
-              <a:t> = {};</a:t>
-            </a:r>
-          </a:p>
-          <a:p>
-            <a:r>
-              <a:rPr lang="ko-KR" altLang="en-US" dirty="0" err="1" smtClean="0"/>
-              <a:t>rtc.permission</a:t>
-            </a:r>
-            <a:r>
-              <a:rPr lang="ko-KR" altLang="en-US" dirty="0" smtClean="0"/>
-              <a:t> = {};</a:t>
-            </a:r>
-          </a:p>
-          <a:p>
-            <a:r>
-              <a:rPr lang="ko-KR" altLang="en-US" dirty="0" err="1" smtClean="0"/>
-              <a:t>rtc.resolutions</a:t>
-            </a:r>
-            <a:r>
-              <a:rPr lang="ko-KR" altLang="en-US" dirty="0" smtClean="0"/>
-              <a:t> = [LIST];</a:t>
-            </a:r>
-          </a:p>
-          <a:p>
-            <a:endParaRPr lang="ko-KR" altLang="en-US" dirty="0" smtClean="0"/>
-          </a:p>
-          <a:p>
-            <a:r>
-              <a:rPr lang="ko-KR" altLang="en-US" dirty="0" err="1" smtClean="0"/>
-              <a:t>setstream</a:t>
-            </a:r>
-            <a:r>
-              <a:rPr lang="ko-KR" altLang="en-US" dirty="0" smtClean="0"/>
-              <a:t>(</a:t>
-            </a:r>
-            <a:r>
-              <a:rPr lang="ko-KR" altLang="en-US" dirty="0" err="1" smtClean="0"/>
-              <a:t>event</a:t>
-            </a:r>
-            <a:r>
-              <a:rPr lang="ko-KR" altLang="en-US" dirty="0" smtClean="0"/>
-              <a:t>);</a:t>
-            </a:r>
-          </a:p>
-          <a:p>
-            <a:r>
-              <a:rPr lang="ko-KR" altLang="en-US" dirty="0" err="1" smtClean="0"/>
-              <a:t>onopen</a:t>
-            </a:r>
-            <a:r>
-              <a:rPr lang="ko-KR" altLang="en-US" dirty="0" smtClean="0"/>
-              <a:t>(</a:t>
-            </a:r>
-            <a:r>
-              <a:rPr lang="ko-KR" altLang="en-US" dirty="0" err="1" smtClean="0"/>
-              <a:t>event</a:t>
-            </a:r>
-            <a:r>
-              <a:rPr lang="ko-KR" altLang="en-US" dirty="0" smtClean="0"/>
-              <a:t>);</a:t>
-            </a:r>
-          </a:p>
-          <a:p>
-            <a:r>
-              <a:rPr lang="ko-KR" altLang="en-US" dirty="0" err="1" smtClean="0"/>
-              <a:t>onleave</a:t>
-            </a:r>
-            <a:r>
-              <a:rPr lang="ko-KR" altLang="en-US" dirty="0" smtClean="0"/>
-              <a:t>(</a:t>
-            </a:r>
-            <a:r>
-              <a:rPr lang="ko-KR" altLang="en-US" dirty="0" err="1" smtClean="0"/>
-              <a:t>event</a:t>
-            </a:r>
-            <a:r>
-              <a:rPr lang="ko-KR" altLang="en-US" dirty="0" smtClean="0"/>
-              <a:t>);</a:t>
-            </a:r>
-          </a:p>
-          <a:p>
-            <a:r>
-              <a:rPr lang="ko-KR" altLang="en-US" dirty="0" err="1" smtClean="0"/>
-              <a:t>onstreamended</a:t>
-            </a:r>
-            <a:r>
-              <a:rPr lang="ko-KR" altLang="en-US" dirty="0" smtClean="0"/>
-              <a:t>(</a:t>
-            </a:r>
-            <a:r>
-              <a:rPr lang="ko-KR" altLang="en-US" dirty="0" err="1" smtClean="0"/>
-              <a:t>event</a:t>
-            </a:r>
-            <a:r>
-              <a:rPr lang="ko-KR" altLang="en-US" dirty="0" smtClean="0"/>
-              <a:t>);</a:t>
-            </a:r>
-          </a:p>
-          <a:p>
-            <a:r>
-              <a:rPr lang="ko-KR" altLang="en-US" dirty="0" err="1" smtClean="0"/>
-              <a:t>onRoomFull</a:t>
-            </a:r>
-            <a:r>
-              <a:rPr lang="ko-KR" altLang="en-US" dirty="0" smtClean="0"/>
-              <a:t>(</a:t>
-            </a:r>
-            <a:r>
-              <a:rPr lang="ko-KR" altLang="en-US" dirty="0" err="1" smtClean="0"/>
-              <a:t>error</a:t>
-            </a:r>
-            <a:r>
-              <a:rPr lang="ko-KR" altLang="en-US" dirty="0" smtClean="0"/>
-              <a:t>);</a:t>
-            </a:r>
-          </a:p>
-          <a:p>
-            <a:r>
-              <a:rPr lang="ko-KR" altLang="en-US" dirty="0" err="1" smtClean="0"/>
-              <a:t>onUserIdAlreadyTaken</a:t>
-            </a:r>
-            <a:r>
-              <a:rPr lang="ko-KR" altLang="en-US" dirty="0" smtClean="0"/>
-              <a:t>(</a:t>
-            </a:r>
-            <a:r>
-              <a:rPr lang="ko-KR" altLang="en-US" dirty="0" err="1" smtClean="0"/>
-              <a:t>oldId</a:t>
-            </a:r>
-            <a:r>
-              <a:rPr lang="ko-KR" altLang="en-US" dirty="0" smtClean="0"/>
-              <a:t>, </a:t>
-            </a:r>
-            <a:r>
-              <a:rPr lang="ko-KR" altLang="en-US" dirty="0" err="1" smtClean="0"/>
-              <a:t>newId</a:t>
-            </a:r>
-            <a:r>
-              <a:rPr lang="ko-KR" altLang="en-US" dirty="0" smtClean="0"/>
-              <a:t>);</a:t>
-            </a:r>
-          </a:p>
-        </p:txBody>
-      </p:sp>
-      <p:sp>
-        <p:nvSpPr>
-          <p:cNvPr id="7" name="직사각형 6"/>
-          <p:cNvSpPr/>
-          <p:nvPr/>
-        </p:nvSpPr>
-        <p:spPr>
-          <a:xfrm>
-            <a:off x="4621823" y="0"/>
-            <a:ext cx="6096000" cy="6186309"/>
-          </a:xfrm>
-          <a:prstGeom prst="rect">
-            <a:avLst/>
-          </a:prstGeom>
-        </p:spPr>
-        <p:txBody>
-          <a:bodyPr>
-            <a:spAutoFit/>
-          </a:bodyPr>
-          <a:lstStyle/>
-          <a:p>
-            <a:r>
-              <a:rPr lang="ko-KR" altLang="en-US" dirty="0" err="1" smtClean="0"/>
-              <a:t>browserNotSupportErrorHandler</a:t>
-            </a:r>
-            <a:r>
-              <a:rPr lang="ko-KR" altLang="en-US" dirty="0"/>
-              <a:t>();</a:t>
-            </a:r>
-          </a:p>
-          <a:p>
-            <a:r>
-              <a:rPr lang="ko-KR" altLang="en-US" dirty="0" err="1"/>
-              <a:t>onBrowserNotSupportError</a:t>
-            </a:r>
-            <a:r>
-              <a:rPr lang="ko-KR" altLang="en-US" dirty="0"/>
-              <a:t>(</a:t>
-            </a:r>
-            <a:r>
-              <a:rPr lang="ko-KR" altLang="en-US" dirty="0" err="1"/>
-              <a:t>errors</a:t>
-            </a:r>
-            <a:r>
-              <a:rPr lang="ko-KR" altLang="en-US" dirty="0"/>
-              <a:t>);</a:t>
-            </a:r>
-          </a:p>
-          <a:p>
-            <a:endParaRPr lang="ko-KR" altLang="en-US" dirty="0"/>
-          </a:p>
-          <a:p>
-            <a:r>
-              <a:rPr lang="ko-KR" altLang="en-US" dirty="0" err="1"/>
-              <a:t>mediaCaptureErrorHandler</a:t>
-            </a:r>
-            <a:r>
-              <a:rPr lang="ko-KR" altLang="en-US" dirty="0"/>
-              <a:t>(</a:t>
-            </a:r>
-            <a:r>
-              <a:rPr lang="ko-KR" altLang="en-US" dirty="0" err="1"/>
-              <a:t>error</a:t>
-            </a:r>
-            <a:r>
-              <a:rPr lang="ko-KR" altLang="en-US" dirty="0"/>
-              <a:t>, </a:t>
-            </a:r>
-            <a:r>
-              <a:rPr lang="ko-KR" altLang="en-US" dirty="0" err="1"/>
-              <a:t>isAudio</a:t>
-            </a:r>
-            <a:r>
-              <a:rPr lang="ko-KR" altLang="en-US" dirty="0"/>
-              <a:t>);</a:t>
-            </a:r>
-          </a:p>
-          <a:p>
-            <a:r>
-              <a:rPr lang="ko-KR" altLang="en-US" dirty="0" err="1"/>
-              <a:t>onMediaCaptureError</a:t>
-            </a:r>
-            <a:r>
-              <a:rPr lang="ko-KR" altLang="en-US" dirty="0"/>
-              <a:t>(</a:t>
-            </a:r>
-            <a:r>
-              <a:rPr lang="ko-KR" altLang="en-US" dirty="0" err="1"/>
-              <a:t>error</a:t>
-            </a:r>
-            <a:r>
-              <a:rPr lang="ko-KR" altLang="en-US" dirty="0"/>
-              <a:t>, </a:t>
-            </a:r>
-            <a:r>
-              <a:rPr lang="ko-KR" altLang="en-US" dirty="0" err="1"/>
-              <a:t>isAudio</a:t>
-            </a:r>
-            <a:r>
-              <a:rPr lang="ko-KR" altLang="en-US" dirty="0"/>
-              <a:t>);</a:t>
-            </a:r>
-          </a:p>
-          <a:p>
-            <a:endParaRPr lang="ko-KR" altLang="en-US" dirty="0"/>
-          </a:p>
-          <a:p>
-            <a:r>
-              <a:rPr lang="ko-KR" altLang="en-US" dirty="0" err="1"/>
-              <a:t>openOrJoin</a:t>
-            </a:r>
-            <a:r>
-              <a:rPr lang="ko-KR" altLang="en-US" dirty="0"/>
-              <a:t>(</a:t>
-            </a:r>
-            <a:r>
-              <a:rPr lang="ko-KR" altLang="en-US" dirty="0" err="1"/>
-              <a:t>userId</a:t>
-            </a:r>
-            <a:r>
-              <a:rPr lang="ko-KR" altLang="en-US" dirty="0"/>
-              <a:t>, </a:t>
-            </a:r>
-            <a:r>
-              <a:rPr lang="ko-KR" altLang="en-US" dirty="0" err="1"/>
-              <a:t>roomId</a:t>
-            </a:r>
-            <a:r>
-              <a:rPr lang="ko-KR" altLang="en-US" dirty="0"/>
-              <a:t>);</a:t>
-            </a:r>
-          </a:p>
-          <a:p>
-            <a:r>
-              <a:rPr lang="ko-KR" altLang="en-US" dirty="0" err="1"/>
-              <a:t>beforeOpenOrJoin</a:t>
-            </a:r>
-            <a:r>
-              <a:rPr lang="ko-KR" altLang="en-US" dirty="0"/>
-              <a:t>(</a:t>
-            </a:r>
-            <a:r>
-              <a:rPr lang="ko-KR" altLang="en-US" dirty="0" err="1"/>
-              <a:t>callback</a:t>
-            </a:r>
-            <a:r>
-              <a:rPr lang="ko-KR" altLang="en-US" dirty="0"/>
-              <a:t>);</a:t>
-            </a:r>
-          </a:p>
-          <a:p>
-            <a:r>
-              <a:rPr lang="ko-KR" altLang="en-US" dirty="0" err="1"/>
-              <a:t>afterOpenOrJoin</a:t>
-            </a:r>
-            <a:r>
-              <a:rPr lang="ko-KR" altLang="en-US" dirty="0"/>
-              <a:t>(</a:t>
-            </a:r>
-            <a:r>
-              <a:rPr lang="ko-KR" altLang="en-US" dirty="0" err="1"/>
-              <a:t>stream</a:t>
-            </a:r>
-            <a:r>
-              <a:rPr lang="ko-KR" altLang="en-US" dirty="0"/>
-              <a:t>);</a:t>
-            </a:r>
-          </a:p>
-          <a:p>
-            <a:r>
-              <a:rPr lang="ko-KR" altLang="en-US" dirty="0" err="1"/>
-              <a:t>deviceSetting</a:t>
-            </a:r>
-            <a:r>
-              <a:rPr lang="ko-KR" altLang="en-US" dirty="0"/>
-              <a:t>(</a:t>
-            </a:r>
-            <a:r>
-              <a:rPr lang="ko-KR" altLang="en-US" dirty="0" err="1"/>
-              <a:t>stream</a:t>
-            </a:r>
-            <a:r>
-              <a:rPr lang="ko-KR" altLang="en-US" dirty="0"/>
-              <a:t>);</a:t>
-            </a:r>
-          </a:p>
-          <a:p>
-            <a:r>
-              <a:rPr lang="ko-KR" altLang="en-US" dirty="0" err="1"/>
-              <a:t>deviceChange</a:t>
-            </a:r>
-            <a:r>
-              <a:rPr lang="ko-KR" altLang="en-US" dirty="0"/>
-              <a:t>(</a:t>
-            </a:r>
-            <a:r>
-              <a:rPr lang="ko-KR" altLang="en-US" dirty="0" err="1"/>
-              <a:t>stream</a:t>
-            </a:r>
-            <a:r>
-              <a:rPr lang="ko-KR" altLang="en-US" dirty="0"/>
-              <a:t>, </a:t>
-            </a:r>
-            <a:r>
-              <a:rPr lang="ko-KR" altLang="en-US" dirty="0" err="1"/>
-              <a:t>deviceId</a:t>
-            </a:r>
-            <a:r>
-              <a:rPr lang="ko-KR" altLang="en-US" dirty="0"/>
-              <a:t>, </a:t>
-            </a:r>
-            <a:r>
-              <a:rPr lang="ko-KR" altLang="en-US" dirty="0" err="1"/>
-              <a:t>kind</a:t>
-            </a:r>
-            <a:r>
-              <a:rPr lang="ko-KR" altLang="en-US" dirty="0"/>
-              <a:t>);</a:t>
-            </a:r>
-          </a:p>
-          <a:p>
-            <a:r>
-              <a:rPr lang="ko-KR" altLang="en-US" dirty="0" err="1"/>
-              <a:t>resolutionSetting</a:t>
-            </a:r>
-            <a:r>
-              <a:rPr lang="ko-KR" altLang="en-US" dirty="0"/>
-              <a:t>(</a:t>
-            </a:r>
-            <a:r>
-              <a:rPr lang="ko-KR" altLang="en-US" dirty="0" err="1"/>
-              <a:t>stream</a:t>
-            </a:r>
-            <a:r>
-              <a:rPr lang="ko-KR" altLang="en-US" dirty="0"/>
-              <a:t>);</a:t>
-            </a:r>
-          </a:p>
-          <a:p>
-            <a:r>
-              <a:rPr lang="ko-KR" altLang="en-US" dirty="0" err="1"/>
-              <a:t>resolutionChange</a:t>
-            </a:r>
-            <a:r>
-              <a:rPr lang="ko-KR" altLang="en-US" dirty="0"/>
-              <a:t>(</a:t>
-            </a:r>
-            <a:r>
-              <a:rPr lang="ko-KR" altLang="en-US" dirty="0" err="1"/>
-              <a:t>stream</a:t>
-            </a:r>
-            <a:r>
-              <a:rPr lang="ko-KR" altLang="en-US" dirty="0"/>
-              <a:t>, </a:t>
-            </a:r>
-            <a:r>
-              <a:rPr lang="ko-KR" altLang="en-US" dirty="0" err="1"/>
-              <a:t>value</a:t>
-            </a:r>
-            <a:r>
-              <a:rPr lang="ko-KR" altLang="en-US" dirty="0"/>
-              <a:t>);</a:t>
-            </a:r>
-          </a:p>
-          <a:p>
-            <a:endParaRPr lang="ko-KR" altLang="en-US" dirty="0"/>
-          </a:p>
-          <a:p>
-            <a:r>
-              <a:rPr lang="ko-KR" altLang="en-US" dirty="0" err="1"/>
-              <a:t>RMCEventHandler</a:t>
-            </a:r>
-            <a:r>
-              <a:rPr lang="ko-KR" altLang="en-US" dirty="0"/>
-              <a:t>();</a:t>
-            </a:r>
-          </a:p>
-          <a:p>
-            <a:r>
-              <a:rPr lang="ko-KR" altLang="en-US" dirty="0" err="1"/>
-              <a:t>setContains</a:t>
-            </a:r>
-            <a:r>
-              <a:rPr lang="ko-KR" altLang="en-US" dirty="0"/>
-              <a:t>();</a:t>
-            </a:r>
-          </a:p>
-          <a:p>
-            <a:endParaRPr lang="ko-KR" altLang="en-US" dirty="0"/>
-          </a:p>
-          <a:p>
-            <a:r>
-              <a:rPr lang="ko-KR" altLang="en-US" dirty="0" err="1"/>
-              <a:t>getUserMedia</a:t>
-            </a:r>
-            <a:r>
-              <a:rPr lang="ko-KR" altLang="en-US" dirty="0"/>
-              <a:t>(</a:t>
-            </a:r>
-            <a:r>
-              <a:rPr lang="ko-KR" altLang="en-US" dirty="0" err="1"/>
-              <a:t>constraints</a:t>
-            </a:r>
-            <a:r>
-              <a:rPr lang="ko-KR" altLang="en-US" dirty="0"/>
-              <a:t>, </a:t>
-            </a:r>
-            <a:r>
-              <a:rPr lang="ko-KR" altLang="en-US" dirty="0" err="1"/>
-              <a:t>kind</a:t>
-            </a:r>
-            <a:r>
-              <a:rPr lang="ko-KR" altLang="en-US" dirty="0"/>
-              <a:t>, </a:t>
-            </a:r>
-            <a:r>
-              <a:rPr lang="ko-KR" altLang="en-US" dirty="0" err="1"/>
-              <a:t>callback</a:t>
-            </a:r>
-            <a:r>
-              <a:rPr lang="ko-KR" altLang="en-US" dirty="0"/>
-              <a:t>);</a:t>
-            </a:r>
-          </a:p>
-          <a:p>
-            <a:endParaRPr lang="ko-KR" altLang="en-US" dirty="0"/>
-          </a:p>
-          <a:p>
-            <a:r>
-              <a:rPr lang="ko-KR" altLang="en-US" dirty="0" err="1"/>
-              <a:t>onstream</a:t>
-            </a:r>
-            <a:r>
-              <a:rPr lang="ko-KR" altLang="en-US" dirty="0"/>
-              <a:t>(</a:t>
-            </a:r>
-            <a:r>
-              <a:rPr lang="ko-KR" altLang="en-US" dirty="0" err="1"/>
-              <a:t>event</a:t>
-            </a:r>
-            <a:r>
-              <a:rPr lang="ko-KR" altLang="en-US" dirty="0"/>
-              <a:t>);</a:t>
-            </a:r>
-          </a:p>
-          <a:p>
-            <a:r>
-              <a:rPr lang="ko-KR" altLang="en-US" dirty="0" err="1"/>
-              <a:t>ondevicesetting</a:t>
-            </a:r>
-            <a:r>
-              <a:rPr lang="ko-KR" altLang="en-US" dirty="0"/>
-              <a:t>(</a:t>
-            </a:r>
-            <a:r>
-              <a:rPr lang="ko-KR" altLang="en-US" dirty="0" err="1"/>
-              <a:t>event</a:t>
-            </a:r>
-            <a:r>
-              <a:rPr lang="ko-KR" altLang="en-US" dirty="0"/>
-              <a:t>);</a:t>
-            </a:r>
-          </a:p>
-          <a:p>
-            <a:r>
-              <a:rPr lang="ko-KR" altLang="en-US" dirty="0" err="1"/>
-              <a:t>onresolutionsetting</a:t>
-            </a:r>
-            <a:r>
-              <a:rPr lang="ko-KR" altLang="en-US" dirty="0"/>
-              <a:t>(</a:t>
-            </a:r>
-            <a:r>
-              <a:rPr lang="ko-KR" altLang="en-US" dirty="0" err="1"/>
-              <a:t>event</a:t>
-            </a:r>
-            <a:r>
-              <a:rPr lang="ko-KR" altLang="en-US" dirty="0"/>
-              <a:t>);</a:t>
-            </a:r>
-            <a:endParaRPr lang="ko-KR" altLang="en-US" dirty="0"/>
-          </a:p>
-        </p:txBody>
-      </p:sp>
-    </p:spTree>
-    <p:extLst>
-      <p:ext uri="{BB962C8B-B14F-4D97-AF65-F5344CB8AC3E}">
-        <p14:creationId xmlns:p14="http://schemas.microsoft.com/office/powerpoint/2010/main" val="4010574434"/>
-      </p:ext>
-    </p:extLst>
-  </p:cSld>
-  <p:clrMapOvr>
-    <a:masterClrMapping/>
-  </p:clrMapOvr>
-  <p:timing>
-    <p:tnLst>
-      <p:par>
-        <p:cTn id="1" dur="indefinite" restart="never" nodeType="tmRoot"/>
-      </p:par>
-    </p:tnLst>
-  </p:timing>
-</p:sld>
-</file>
-
-<file path=ppt/slides/slide2.xml><?xml version="1.0" encoding="utf-8"?>
-<p:sld xmlns:a="http://schemas.openxmlformats.org/drawingml/2006/main" xmlns:r="http://schemas.openxmlformats.org/officeDocument/2006/relationships" xmlns:p="http://schemas.openxmlformats.org/presentationml/2006/main">
-  <p:cSld>
-    <p:spTree>
-      <p:nvGrpSpPr>
-        <p:cNvPr id="1" name=""/>
-        <p:cNvGrpSpPr/>
-        <p:nvPr/>
-      </p:nvGrpSpPr>
-      <p:grpSpPr>
-        <a:xfrm>
-          <a:off x="0" y="0"/>
-          <a:ext cx="0" cy="0"/>
-          <a:chOff x="0" y="0"/>
-          <a:chExt cx="0" cy="0"/>
-        </a:xfrm>
-      </p:grpSpPr>
-      <p:sp>
-        <p:nvSpPr>
           <p:cNvPr id="7" name="직사각형 6"/>
           <p:cNvSpPr/>
           <p:nvPr/>
@@ -3634,7 +2986,7 @@
           <a:lstStyle/>
           <a:p>
             <a:r>
-              <a:rPr lang="ko-KR" altLang="en-US" sz="1100" dirty="0" err="1" smtClean="0">
+              <a:rPr lang="ko-KR" altLang="en-US" sz="1100" dirty="0" err="1">
                 <a:solidFill>
                   <a:schemeClr val="tx1"/>
                 </a:solidFill>
@@ -3642,18 +2994,13 @@
               <a:t>browserNotSupportErrorHandler</a:t>
             </a:r>
             <a:r>
-              <a:rPr lang="ko-KR" altLang="en-US" sz="1100" dirty="0" smtClean="0">
+              <a:rPr lang="ko-KR" altLang="en-US" sz="1100" dirty="0">
                 <a:solidFill>
                   <a:schemeClr val="tx1"/>
                 </a:solidFill>
               </a:rPr>
               <a:t>();</a:t>
             </a:r>
-            <a:endParaRPr lang="ko-KR" altLang="en-US" sz="1100" dirty="0">
-              <a:solidFill>
-                <a:schemeClr val="tx1"/>
-              </a:solidFill>
-            </a:endParaRPr>
           </a:p>
         </p:txBody>
       </p:sp>
@@ -3694,7 +3041,7 @@
           <a:lstStyle/>
           <a:p>
             <a:r>
-              <a:rPr lang="ko-KR" altLang="en-US" sz="1100" dirty="0" err="1" smtClean="0">
+              <a:rPr lang="ko-KR" altLang="en-US" sz="1100" dirty="0" err="1">
                 <a:solidFill>
                   <a:schemeClr val="tx1"/>
                 </a:solidFill>
@@ -3702,7 +3049,7 @@
               <a:t>onBrowserNotSupportError</a:t>
             </a:r>
             <a:r>
-              <a:rPr lang="ko-KR" altLang="en-US" sz="1100" dirty="0" smtClean="0">
+              <a:rPr lang="ko-KR" altLang="en-US" sz="1100" dirty="0">
                 <a:solidFill>
                   <a:schemeClr val="tx1"/>
                 </a:solidFill>
@@ -3710,7 +3057,7 @@
               <a:t>(</a:t>
             </a:r>
             <a:r>
-              <a:rPr lang="ko-KR" altLang="en-US" sz="1100" dirty="0" err="1" smtClean="0">
+              <a:rPr lang="ko-KR" altLang="en-US" sz="1100" dirty="0" err="1">
                 <a:solidFill>
                   <a:schemeClr val="tx1"/>
                 </a:solidFill>
@@ -3718,7 +3065,7 @@
               <a:t>errors</a:t>
             </a:r>
             <a:r>
-              <a:rPr lang="ko-KR" altLang="en-US" sz="1100" dirty="0" smtClean="0">
+              <a:rPr lang="ko-KR" altLang="en-US" sz="1100" dirty="0">
                 <a:solidFill>
                   <a:schemeClr val="tx1"/>
                 </a:solidFill>
@@ -3765,7 +3112,7 @@
           <a:lstStyle/>
           <a:p>
             <a:r>
-              <a:rPr lang="ko-KR" altLang="en-US" sz="1100" dirty="0" err="1" smtClean="0">
+              <a:rPr lang="ko-KR" altLang="en-US" sz="1100" dirty="0" err="1">
                 <a:solidFill>
                   <a:schemeClr val="tx1"/>
                 </a:solidFill>
@@ -3773,7 +3120,7 @@
               <a:t>mediaCaptureErrorHandler</a:t>
             </a:r>
             <a:r>
-              <a:rPr lang="ko-KR" altLang="en-US" sz="1100" dirty="0" smtClean="0">
+              <a:rPr lang="ko-KR" altLang="en-US" sz="1100" dirty="0">
                 <a:solidFill>
                   <a:schemeClr val="tx1"/>
                 </a:solidFill>
@@ -3781,7 +3128,7 @@
               <a:t>(</a:t>
             </a:r>
             <a:r>
-              <a:rPr lang="ko-KR" altLang="en-US" sz="1100" dirty="0" err="1" smtClean="0">
+              <a:rPr lang="ko-KR" altLang="en-US" sz="1100" dirty="0" err="1">
                 <a:solidFill>
                   <a:schemeClr val="tx1"/>
                 </a:solidFill>
@@ -3789,7 +3136,7 @@
               <a:t>error</a:t>
             </a:r>
             <a:r>
-              <a:rPr lang="ko-KR" altLang="en-US" sz="1100" dirty="0" smtClean="0">
+              <a:rPr lang="ko-KR" altLang="en-US" sz="1100" dirty="0">
                 <a:solidFill>
                   <a:schemeClr val="tx1"/>
                 </a:solidFill>
@@ -3797,7 +3144,7 @@
               <a:t>, </a:t>
             </a:r>
             <a:r>
-              <a:rPr lang="ko-KR" altLang="en-US" sz="1100" dirty="0" err="1" smtClean="0">
+              <a:rPr lang="ko-KR" altLang="en-US" sz="1100" dirty="0" err="1">
                 <a:solidFill>
                   <a:schemeClr val="tx1"/>
                 </a:solidFill>
@@ -3805,18 +3152,13 @@
               <a:t>isAudio</a:t>
             </a:r>
             <a:r>
-              <a:rPr lang="ko-KR" altLang="en-US" sz="1100" dirty="0" smtClean="0">
+              <a:rPr lang="ko-KR" altLang="en-US" sz="1100" dirty="0">
                 <a:solidFill>
                   <a:schemeClr val="tx1"/>
                 </a:solidFill>
               </a:rPr>
               <a:t>);</a:t>
             </a:r>
-            <a:endParaRPr lang="ko-KR" altLang="en-US" sz="1100" dirty="0">
-              <a:solidFill>
-                <a:schemeClr val="tx1"/>
-              </a:solidFill>
-            </a:endParaRPr>
           </a:p>
         </p:txBody>
       </p:sp>
@@ -3857,7 +3199,7 @@
           <a:lstStyle/>
           <a:p>
             <a:r>
-              <a:rPr lang="ko-KR" altLang="en-US" sz="1100" dirty="0" err="1" smtClean="0">
+              <a:rPr lang="ko-KR" altLang="en-US" sz="1100" dirty="0" err="1">
                 <a:solidFill>
                   <a:schemeClr val="tx1"/>
                 </a:solidFill>
@@ -3865,7 +3207,7 @@
               <a:t>onMediaCaptureError</a:t>
             </a:r>
             <a:r>
-              <a:rPr lang="ko-KR" altLang="en-US" sz="1100" dirty="0" smtClean="0">
+              <a:rPr lang="ko-KR" altLang="en-US" sz="1100" dirty="0">
                 <a:solidFill>
                   <a:schemeClr val="tx1"/>
                 </a:solidFill>
@@ -3873,7 +3215,7 @@
               <a:t>(</a:t>
             </a:r>
             <a:r>
-              <a:rPr lang="ko-KR" altLang="en-US" sz="1100" dirty="0" err="1" smtClean="0">
+              <a:rPr lang="ko-KR" altLang="en-US" sz="1100" dirty="0" err="1">
                 <a:solidFill>
                   <a:schemeClr val="tx1"/>
                 </a:solidFill>
@@ -3881,7 +3223,7 @@
               <a:t>error</a:t>
             </a:r>
             <a:r>
-              <a:rPr lang="ko-KR" altLang="en-US" sz="1100" dirty="0" smtClean="0">
+              <a:rPr lang="ko-KR" altLang="en-US" sz="1100" dirty="0">
                 <a:solidFill>
                   <a:schemeClr val="tx1"/>
                 </a:solidFill>
@@ -3889,7 +3231,7 @@
               <a:t>, </a:t>
             </a:r>
             <a:r>
-              <a:rPr lang="ko-KR" altLang="en-US" sz="1100" dirty="0" err="1" smtClean="0">
+              <a:rPr lang="ko-KR" altLang="en-US" sz="1100" dirty="0" err="1">
                 <a:solidFill>
                   <a:schemeClr val="tx1"/>
                 </a:solidFill>
@@ -3897,18 +3239,13 @@
               <a:t>isAudio</a:t>
             </a:r>
             <a:r>
-              <a:rPr lang="ko-KR" altLang="en-US" sz="1100" dirty="0" smtClean="0">
+              <a:rPr lang="ko-KR" altLang="en-US" sz="1100" dirty="0">
                 <a:solidFill>
                   <a:schemeClr val="tx1"/>
                 </a:solidFill>
               </a:rPr>
               <a:t>);</a:t>
             </a:r>
-            <a:endParaRPr lang="ko-KR" altLang="en-US" sz="1100" dirty="0">
-              <a:solidFill>
-                <a:schemeClr val="tx1"/>
-              </a:solidFill>
-            </a:endParaRPr>
           </a:p>
         </p:txBody>
       </p:sp>
@@ -3949,7 +3286,7 @@
           <a:lstStyle/>
           <a:p>
             <a:r>
-              <a:rPr lang="ko-KR" altLang="en-US" sz="1100" dirty="0" err="1" smtClean="0">
+              <a:rPr lang="ko-KR" altLang="en-US" sz="1100" dirty="0" err="1">
                 <a:solidFill>
                   <a:schemeClr val="tx1"/>
                 </a:solidFill>
@@ -3957,7 +3294,7 @@
               <a:t>openOrJoin</a:t>
             </a:r>
             <a:r>
-              <a:rPr lang="ko-KR" altLang="en-US" sz="1100" dirty="0" smtClean="0">
+              <a:rPr lang="ko-KR" altLang="en-US" sz="1100" dirty="0">
                 <a:solidFill>
                   <a:schemeClr val="tx1"/>
                 </a:solidFill>
@@ -3965,7 +3302,7 @@
               <a:t>(</a:t>
             </a:r>
             <a:r>
-              <a:rPr lang="ko-KR" altLang="en-US" sz="1100" dirty="0" err="1" smtClean="0">
+              <a:rPr lang="ko-KR" altLang="en-US" sz="1100" dirty="0" err="1">
                 <a:solidFill>
                   <a:schemeClr val="tx1"/>
                 </a:solidFill>
@@ -3973,7 +3310,7 @@
               <a:t>userId</a:t>
             </a:r>
             <a:r>
-              <a:rPr lang="ko-KR" altLang="en-US" sz="1100" dirty="0" smtClean="0">
+              <a:rPr lang="ko-KR" altLang="en-US" sz="1100" dirty="0">
                 <a:solidFill>
                   <a:schemeClr val="tx1"/>
                 </a:solidFill>
@@ -3981,7 +3318,7 @@
               <a:t>, </a:t>
             </a:r>
             <a:r>
-              <a:rPr lang="ko-KR" altLang="en-US" sz="1100" dirty="0" err="1" smtClean="0">
+              <a:rPr lang="ko-KR" altLang="en-US" sz="1100" dirty="0" err="1">
                 <a:solidFill>
                   <a:schemeClr val="tx1"/>
                 </a:solidFill>
@@ -3989,18 +3326,13 @@
               <a:t>roomId</a:t>
             </a:r>
             <a:r>
-              <a:rPr lang="ko-KR" altLang="en-US" sz="1100" dirty="0" smtClean="0">
+              <a:rPr lang="ko-KR" altLang="en-US" sz="1100" dirty="0">
                 <a:solidFill>
                   <a:schemeClr val="tx1"/>
                 </a:solidFill>
               </a:rPr>
               <a:t>);</a:t>
             </a:r>
-            <a:endParaRPr lang="ko-KR" altLang="en-US" sz="1100" dirty="0">
-              <a:solidFill>
-                <a:schemeClr val="tx1"/>
-              </a:solidFill>
-            </a:endParaRPr>
           </a:p>
         </p:txBody>
       </p:sp>
@@ -4041,7 +3373,7 @@
           <a:lstStyle/>
           <a:p>
             <a:r>
-              <a:rPr lang="ko-KR" altLang="en-US" sz="1100" dirty="0" err="1" smtClean="0">
+              <a:rPr lang="ko-KR" altLang="en-US" sz="1100" dirty="0" err="1">
                 <a:solidFill>
                   <a:schemeClr val="tx1"/>
                 </a:solidFill>
@@ -4049,7 +3381,7 @@
               <a:t>beforeOpenOrJoin</a:t>
             </a:r>
             <a:r>
-              <a:rPr lang="ko-KR" altLang="en-US" sz="1100" dirty="0" smtClean="0">
+              <a:rPr lang="ko-KR" altLang="en-US" sz="1100" dirty="0">
                 <a:solidFill>
                   <a:schemeClr val="tx1"/>
                 </a:solidFill>
@@ -4057,7 +3389,7 @@
               <a:t>(</a:t>
             </a:r>
             <a:r>
-              <a:rPr lang="ko-KR" altLang="en-US" sz="1100" dirty="0" err="1" smtClean="0">
+              <a:rPr lang="ko-KR" altLang="en-US" sz="1100" dirty="0" err="1">
                 <a:solidFill>
                   <a:schemeClr val="tx1"/>
                 </a:solidFill>
@@ -4065,18 +3397,13 @@
               <a:t>callback</a:t>
             </a:r>
             <a:r>
-              <a:rPr lang="ko-KR" altLang="en-US" sz="1100" dirty="0" smtClean="0">
+              <a:rPr lang="ko-KR" altLang="en-US" sz="1100" dirty="0">
                 <a:solidFill>
                   <a:schemeClr val="tx1"/>
                 </a:solidFill>
               </a:rPr>
               <a:t>);</a:t>
             </a:r>
-            <a:endParaRPr lang="ko-KR" altLang="en-US" sz="1100" dirty="0">
-              <a:solidFill>
-                <a:schemeClr val="tx1"/>
-              </a:solidFill>
-            </a:endParaRPr>
           </a:p>
         </p:txBody>
       </p:sp>
@@ -4117,7 +3444,7 @@
           <a:lstStyle/>
           <a:p>
             <a:r>
-              <a:rPr lang="ko-KR" altLang="en-US" sz="1100" dirty="0" err="1" smtClean="0">
+              <a:rPr lang="ko-KR" altLang="en-US" sz="1100" dirty="0" err="1">
                 <a:solidFill>
                   <a:schemeClr val="tx1"/>
                 </a:solidFill>
@@ -4125,7 +3452,7 @@
               <a:t>deviceSetting</a:t>
             </a:r>
             <a:r>
-              <a:rPr lang="ko-KR" altLang="en-US" sz="1100" dirty="0" smtClean="0">
+              <a:rPr lang="ko-KR" altLang="en-US" sz="1100" dirty="0">
                 <a:solidFill>
                   <a:schemeClr val="tx1"/>
                 </a:solidFill>
@@ -4133,7 +3460,7 @@
               <a:t>(</a:t>
             </a:r>
             <a:r>
-              <a:rPr lang="ko-KR" altLang="en-US" sz="1100" dirty="0" err="1" smtClean="0">
+              <a:rPr lang="ko-KR" altLang="en-US" sz="1100" dirty="0" err="1">
                 <a:solidFill>
                   <a:srgbClr val="FF0000"/>
                 </a:solidFill>
@@ -4141,18 +3468,13 @@
               <a:t>stream</a:t>
             </a:r>
             <a:r>
-              <a:rPr lang="ko-KR" altLang="en-US" sz="1100" dirty="0" smtClean="0">
+              <a:rPr lang="ko-KR" altLang="en-US" sz="1100" dirty="0">
                 <a:solidFill>
                   <a:schemeClr val="tx1"/>
                 </a:solidFill>
               </a:rPr>
               <a:t>);</a:t>
             </a:r>
-            <a:endParaRPr lang="ko-KR" altLang="en-US" sz="1100" dirty="0">
-              <a:solidFill>
-                <a:schemeClr val="tx1"/>
-              </a:solidFill>
-            </a:endParaRPr>
           </a:p>
         </p:txBody>
       </p:sp>
@@ -4195,7 +3517,7 @@
           <a:lstStyle/>
           <a:p>
             <a:r>
-              <a:rPr lang="ko-KR" altLang="en-US" sz="1100" dirty="0" err="1" smtClean="0">
+              <a:rPr lang="ko-KR" altLang="en-US" sz="1100" dirty="0" err="1">
                 <a:solidFill>
                   <a:schemeClr val="tx1"/>
                 </a:solidFill>
@@ -4203,7 +3525,7 @@
               <a:t>deviceChange</a:t>
             </a:r>
             <a:r>
-              <a:rPr lang="en-US" altLang="ko-KR" sz="1100" dirty="0" smtClean="0">
+              <a:rPr lang="en-US" altLang="ko-KR" sz="1100" dirty="0">
                 <a:solidFill>
                   <a:schemeClr val="tx1"/>
                 </a:solidFill>
@@ -4211,7 +3533,7 @@
               <a:t>(</a:t>
             </a:r>
             <a:r>
-              <a:rPr lang="ko-KR" altLang="en-US" sz="1100" dirty="0" err="1" smtClean="0">
+              <a:rPr lang="ko-KR" altLang="en-US" sz="1100" dirty="0" err="1">
                 <a:solidFill>
                   <a:schemeClr val="tx1"/>
                 </a:solidFill>
@@ -4219,7 +3541,7 @@
               <a:t>stream</a:t>
             </a:r>
             <a:r>
-              <a:rPr lang="ko-KR" altLang="en-US" sz="1100" dirty="0" smtClean="0">
+              <a:rPr lang="ko-KR" altLang="en-US" sz="1100" dirty="0">
                 <a:solidFill>
                   <a:schemeClr val="tx1"/>
                 </a:solidFill>
@@ -4227,7 +3549,7 @@
               <a:t>, </a:t>
             </a:r>
             <a:r>
-              <a:rPr lang="ko-KR" altLang="en-US" sz="1100" dirty="0" err="1" smtClean="0">
+              <a:rPr lang="ko-KR" altLang="en-US" sz="1100" dirty="0" err="1">
                 <a:solidFill>
                   <a:schemeClr val="tx1"/>
                 </a:solidFill>
@@ -4235,7 +3557,7 @@
               <a:t>deviceId</a:t>
             </a:r>
             <a:r>
-              <a:rPr lang="ko-KR" altLang="en-US" sz="1100" dirty="0" smtClean="0">
+              <a:rPr lang="ko-KR" altLang="en-US" sz="1100" dirty="0">
                 <a:solidFill>
                   <a:schemeClr val="tx1"/>
                 </a:solidFill>
@@ -4243,7 +3565,7 @@
               <a:t>, </a:t>
             </a:r>
             <a:r>
-              <a:rPr lang="ko-KR" altLang="en-US" sz="1100" dirty="0" err="1" smtClean="0">
+              <a:rPr lang="ko-KR" altLang="en-US" sz="1100" dirty="0" err="1">
                 <a:solidFill>
                   <a:schemeClr val="tx1"/>
                 </a:solidFill>
@@ -4251,18 +3573,13 @@
               <a:t>kind</a:t>
             </a:r>
             <a:r>
-              <a:rPr lang="ko-KR" altLang="en-US" sz="1100" dirty="0" smtClean="0">
+              <a:rPr lang="ko-KR" altLang="en-US" sz="1100" dirty="0">
                 <a:solidFill>
                   <a:schemeClr val="tx1"/>
                 </a:solidFill>
               </a:rPr>
               <a:t>);</a:t>
             </a:r>
-            <a:endParaRPr lang="ko-KR" altLang="en-US" sz="1100" dirty="0">
-              <a:solidFill>
-                <a:schemeClr val="tx1"/>
-              </a:solidFill>
-            </a:endParaRPr>
           </a:p>
         </p:txBody>
       </p:sp>
@@ -4303,7 +3620,7 @@
           <a:lstStyle/>
           <a:p>
             <a:r>
-              <a:rPr lang="ko-KR" altLang="en-US" sz="1100" dirty="0" err="1" smtClean="0">
+              <a:rPr lang="ko-KR" altLang="en-US" sz="1100" dirty="0" err="1">
                 <a:solidFill>
                   <a:schemeClr val="tx1"/>
                 </a:solidFill>
@@ -4311,7 +3628,7 @@
               <a:t>resolutionSetting</a:t>
             </a:r>
             <a:r>
-              <a:rPr lang="ko-KR" altLang="en-US" sz="1100" dirty="0" smtClean="0">
+              <a:rPr lang="ko-KR" altLang="en-US" sz="1100" dirty="0">
                 <a:solidFill>
                   <a:schemeClr val="tx1"/>
                 </a:solidFill>
@@ -4319,7 +3636,7 @@
               <a:t>(</a:t>
             </a:r>
             <a:r>
-              <a:rPr lang="ko-KR" altLang="en-US" sz="1100" dirty="0" err="1" smtClean="0">
+              <a:rPr lang="ko-KR" altLang="en-US" sz="1100" dirty="0" err="1">
                 <a:solidFill>
                   <a:srgbClr val="FF0000"/>
                 </a:solidFill>
@@ -4327,18 +3644,13 @@
               <a:t>stream</a:t>
             </a:r>
             <a:r>
-              <a:rPr lang="ko-KR" altLang="en-US" sz="1100" dirty="0" smtClean="0">
+              <a:rPr lang="ko-KR" altLang="en-US" sz="1100" dirty="0">
                 <a:solidFill>
                   <a:schemeClr val="tx1"/>
                 </a:solidFill>
               </a:rPr>
               <a:t>);</a:t>
             </a:r>
-            <a:endParaRPr lang="ko-KR" altLang="en-US" sz="1100" dirty="0">
-              <a:solidFill>
-                <a:schemeClr val="tx1"/>
-              </a:solidFill>
-            </a:endParaRPr>
           </a:p>
         </p:txBody>
       </p:sp>
@@ -4381,7 +3693,7 @@
           <a:lstStyle/>
           <a:p>
             <a:r>
-              <a:rPr lang="ko-KR" altLang="en-US" sz="1100" dirty="0" err="1" smtClean="0">
+              <a:rPr lang="ko-KR" altLang="en-US" sz="1100" dirty="0" err="1">
                 <a:solidFill>
                   <a:schemeClr val="tx1"/>
                 </a:solidFill>
@@ -4389,7 +3701,7 @@
               <a:t>resolutionChange</a:t>
             </a:r>
             <a:r>
-              <a:rPr lang="ko-KR" altLang="en-US" sz="1100" dirty="0" smtClean="0">
+              <a:rPr lang="ko-KR" altLang="en-US" sz="1100" dirty="0">
                 <a:solidFill>
                   <a:schemeClr val="tx1"/>
                 </a:solidFill>
@@ -4397,7 +3709,7 @@
               <a:t>(</a:t>
             </a:r>
             <a:r>
-              <a:rPr lang="ko-KR" altLang="en-US" sz="1100" dirty="0" err="1" smtClean="0">
+              <a:rPr lang="ko-KR" altLang="en-US" sz="1100" dirty="0" err="1">
                 <a:solidFill>
                   <a:schemeClr val="tx1"/>
                 </a:solidFill>
@@ -4405,7 +3717,7 @@
               <a:t>stream</a:t>
             </a:r>
             <a:r>
-              <a:rPr lang="ko-KR" altLang="en-US" sz="1100" dirty="0" smtClean="0">
+              <a:rPr lang="ko-KR" altLang="en-US" sz="1100" dirty="0">
                 <a:solidFill>
                   <a:schemeClr val="tx1"/>
                 </a:solidFill>
@@ -4413,7 +3725,7 @@
               <a:t>, </a:t>
             </a:r>
             <a:r>
-              <a:rPr lang="ko-KR" altLang="en-US" sz="1100" dirty="0" err="1" smtClean="0">
+              <a:rPr lang="ko-KR" altLang="en-US" sz="1100" dirty="0" err="1">
                 <a:solidFill>
                   <a:schemeClr val="tx1"/>
                 </a:solidFill>
@@ -4421,18 +3733,13 @@
               <a:t>value</a:t>
             </a:r>
             <a:r>
-              <a:rPr lang="ko-KR" altLang="en-US" sz="1100" dirty="0" smtClean="0">
+              <a:rPr lang="ko-KR" altLang="en-US" sz="1100" dirty="0">
                 <a:solidFill>
                   <a:schemeClr val="tx1"/>
                 </a:solidFill>
               </a:rPr>
               <a:t>);</a:t>
             </a:r>
-            <a:endParaRPr lang="ko-KR" altLang="en-US" sz="1100" dirty="0">
-              <a:solidFill>
-                <a:schemeClr val="tx1"/>
-              </a:solidFill>
-            </a:endParaRPr>
           </a:p>
         </p:txBody>
       </p:sp>
@@ -4473,7 +3780,7 @@
           <a:lstStyle/>
           <a:p>
             <a:r>
-              <a:rPr lang="ko-KR" altLang="en-US" sz="1100" dirty="0" err="1" smtClean="0">
+              <a:rPr lang="ko-KR" altLang="en-US" sz="1100" dirty="0" err="1">
                 <a:solidFill>
                   <a:schemeClr val="tx1"/>
                 </a:solidFill>
@@ -4481,18 +3788,13 @@
               <a:t>RMCEventHandler</a:t>
             </a:r>
             <a:r>
-              <a:rPr lang="ko-KR" altLang="en-US" sz="1100" dirty="0" smtClean="0">
+              <a:rPr lang="ko-KR" altLang="en-US" sz="1100" dirty="0">
                 <a:solidFill>
                   <a:schemeClr val="tx1"/>
                 </a:solidFill>
               </a:rPr>
               <a:t>();</a:t>
             </a:r>
-            <a:endParaRPr lang="ko-KR" altLang="en-US" sz="1100" dirty="0">
-              <a:solidFill>
-                <a:schemeClr val="tx1"/>
-              </a:solidFill>
-            </a:endParaRPr>
           </a:p>
         </p:txBody>
       </p:sp>
@@ -4533,7 +3835,7 @@
           <a:lstStyle/>
           <a:p>
             <a:r>
-              <a:rPr lang="ko-KR" altLang="en-US" sz="1100" dirty="0" err="1" smtClean="0">
+              <a:rPr lang="ko-KR" altLang="en-US" sz="1100" dirty="0" err="1">
                 <a:solidFill>
                   <a:schemeClr val="tx1"/>
                 </a:solidFill>
@@ -4541,7 +3843,7 @@
               <a:t>getUserMedia</a:t>
             </a:r>
             <a:r>
-              <a:rPr lang="ko-KR" altLang="en-US" sz="1100" dirty="0" smtClean="0">
+              <a:rPr lang="ko-KR" altLang="en-US" sz="1100" dirty="0">
                 <a:solidFill>
                   <a:schemeClr val="tx1"/>
                 </a:solidFill>
@@ -4549,7 +3851,7 @@
               <a:t>(</a:t>
             </a:r>
             <a:r>
-              <a:rPr lang="ko-KR" altLang="en-US" sz="1100" dirty="0" err="1" smtClean="0">
+              <a:rPr lang="ko-KR" altLang="en-US" sz="1100" dirty="0" err="1">
                 <a:solidFill>
                   <a:schemeClr val="tx1"/>
                 </a:solidFill>
@@ -4557,7 +3859,7 @@
               <a:t>constraints</a:t>
             </a:r>
             <a:r>
-              <a:rPr lang="ko-KR" altLang="en-US" sz="1100" dirty="0" smtClean="0">
+              <a:rPr lang="ko-KR" altLang="en-US" sz="1100" dirty="0">
                 <a:solidFill>
                   <a:schemeClr val="tx1"/>
                 </a:solidFill>
@@ -4565,7 +3867,7 @@
               <a:t>, </a:t>
             </a:r>
             <a:r>
-              <a:rPr lang="ko-KR" altLang="en-US" sz="1100" dirty="0" err="1" smtClean="0">
+              <a:rPr lang="ko-KR" altLang="en-US" sz="1100" dirty="0" err="1">
                 <a:solidFill>
                   <a:schemeClr val="tx1"/>
                 </a:solidFill>
@@ -4573,7 +3875,7 @@
               <a:t>kind</a:t>
             </a:r>
             <a:r>
-              <a:rPr lang="ko-KR" altLang="en-US" sz="1100" dirty="0" smtClean="0">
+              <a:rPr lang="ko-KR" altLang="en-US" sz="1100" dirty="0">
                 <a:solidFill>
                   <a:schemeClr val="tx1"/>
                 </a:solidFill>
@@ -4581,7 +3883,7 @@
               <a:t>, </a:t>
             </a:r>
             <a:r>
-              <a:rPr lang="ko-KR" altLang="en-US" sz="1100" dirty="0" err="1" smtClean="0">
+              <a:rPr lang="ko-KR" altLang="en-US" sz="1100" dirty="0" err="1">
                 <a:solidFill>
                   <a:schemeClr val="tx1"/>
                 </a:solidFill>
@@ -4589,18 +3891,13 @@
               <a:t>callback</a:t>
             </a:r>
             <a:r>
-              <a:rPr lang="ko-KR" altLang="en-US" sz="1100" dirty="0" smtClean="0">
+              <a:rPr lang="ko-KR" altLang="en-US" sz="1100" dirty="0">
                 <a:solidFill>
                   <a:schemeClr val="tx1"/>
                 </a:solidFill>
               </a:rPr>
               <a:t>);</a:t>
             </a:r>
-            <a:endParaRPr lang="ko-KR" altLang="en-US" sz="1100" dirty="0">
-              <a:solidFill>
-                <a:schemeClr val="tx1"/>
-              </a:solidFill>
-            </a:endParaRPr>
           </a:p>
         </p:txBody>
       </p:sp>
@@ -4612,7 +3909,7 @@
         </p:nvSpPr>
         <p:spPr>
           <a:xfrm>
-            <a:off x="7881442" y="3761971"/>
+            <a:off x="6418787" y="3360036"/>
             <a:ext cx="1294667" cy="302460"/>
           </a:xfrm>
           <a:prstGeom prst="rect">
@@ -4641,7 +3938,7 @@
           <a:lstStyle/>
           <a:p>
             <a:r>
-              <a:rPr lang="ko-KR" altLang="en-US" sz="1100" dirty="0" err="1" smtClean="0">
+              <a:rPr lang="ko-KR" altLang="en-US" sz="1100" dirty="0" err="1">
                 <a:solidFill>
                   <a:schemeClr val="tx1"/>
                 </a:solidFill>
@@ -4649,7 +3946,7 @@
               <a:t>onstream</a:t>
             </a:r>
             <a:r>
-              <a:rPr lang="ko-KR" altLang="en-US" sz="1100" dirty="0" smtClean="0">
+              <a:rPr lang="ko-KR" altLang="en-US" sz="1100" dirty="0">
                 <a:solidFill>
                   <a:schemeClr val="tx1"/>
                 </a:solidFill>
@@ -4657,26 +3954,21 @@
               <a:t>(</a:t>
             </a:r>
             <a:r>
-              <a:rPr lang="ko-KR" altLang="en-US" sz="1100" dirty="0" err="1" smtClean="0">
-                <a:solidFill>
-                  <a:schemeClr val="tx1"/>
-                </a:solidFill>
-              </a:rPr>
-              <a:t>event</a:t>
-            </a:r>
-            <a:r>
-              <a:rPr lang="ko-KR" altLang="en-US" sz="1100" dirty="0" smtClean="0">
+              <a:rPr lang="en-US" altLang="ko-KR" sz="1100" dirty="0">
+                <a:solidFill>
+                  <a:schemeClr val="tx1"/>
+                </a:solidFill>
+              </a:rPr>
+              <a:t>stream</a:t>
+            </a:r>
+            <a:r>
+              <a:rPr lang="ko-KR" altLang="en-US" sz="1100" dirty="0">
                 <a:solidFill>
                   <a:schemeClr val="tx1"/>
                 </a:solidFill>
               </a:rPr>
               <a:t>);</a:t>
             </a:r>
-            <a:endParaRPr lang="ko-KR" altLang="en-US" sz="1100" dirty="0">
-              <a:solidFill>
-                <a:schemeClr val="tx1"/>
-              </a:solidFill>
-            </a:endParaRPr>
           </a:p>
         </p:txBody>
       </p:sp>
@@ -4688,7 +3980,7 @@
         </p:nvSpPr>
         <p:spPr>
           <a:xfrm>
-            <a:off x="5474919" y="6385798"/>
+            <a:off x="10204017" y="6365783"/>
             <a:ext cx="1614122" cy="288910"/>
           </a:xfrm>
           <a:prstGeom prst="rect">
@@ -4717,7 +4009,7 @@
           <a:lstStyle/>
           <a:p>
             <a:r>
-              <a:rPr lang="ko-KR" altLang="en-US" sz="1100" dirty="0" err="1" smtClean="0">
+              <a:rPr lang="ko-KR" altLang="en-US" sz="1100" dirty="0" err="1">
                 <a:solidFill>
                   <a:schemeClr val="tx1"/>
                 </a:solidFill>
@@ -4725,7 +4017,7 @@
               <a:t>ondevicesetting</a:t>
             </a:r>
             <a:r>
-              <a:rPr lang="ko-KR" altLang="en-US" sz="1100" dirty="0" smtClean="0">
+              <a:rPr lang="ko-KR" altLang="en-US" sz="1100" dirty="0">
                 <a:solidFill>
                   <a:schemeClr val="tx1"/>
                 </a:solidFill>
@@ -4733,7 +4025,7 @@
               <a:t>(</a:t>
             </a:r>
             <a:r>
-              <a:rPr lang="ko-KR" altLang="en-US" sz="1100" dirty="0" err="1" smtClean="0">
+              <a:rPr lang="ko-KR" altLang="en-US" sz="1100" dirty="0" err="1">
                 <a:solidFill>
                   <a:schemeClr val="tx1"/>
                 </a:solidFill>
@@ -4741,18 +4033,13 @@
               <a:t>event</a:t>
             </a:r>
             <a:r>
-              <a:rPr lang="ko-KR" altLang="en-US" sz="1100" dirty="0" smtClean="0">
+              <a:rPr lang="ko-KR" altLang="en-US" sz="1100" dirty="0">
                 <a:solidFill>
                   <a:schemeClr val="tx1"/>
                 </a:solidFill>
               </a:rPr>
               <a:t>);</a:t>
             </a:r>
-            <a:endParaRPr lang="ko-KR" altLang="en-US" sz="1100" dirty="0">
-              <a:solidFill>
-                <a:schemeClr val="tx1"/>
-              </a:solidFill>
-            </a:endParaRPr>
           </a:p>
         </p:txBody>
       </p:sp>
@@ -4764,7 +4051,7 @@
         </p:nvSpPr>
         <p:spPr>
           <a:xfrm>
-            <a:off x="5313194" y="5906236"/>
+            <a:off x="10042292" y="5886221"/>
             <a:ext cx="1872733" cy="441715"/>
           </a:xfrm>
           <a:prstGeom prst="rect">
@@ -4793,7 +4080,7 @@
           <a:lstStyle/>
           <a:p>
             <a:r>
-              <a:rPr lang="ko-KR" altLang="en-US" sz="1100" dirty="0" err="1" smtClean="0">
+              <a:rPr lang="ko-KR" altLang="en-US" sz="1100" dirty="0" err="1">
                 <a:solidFill>
                   <a:schemeClr val="tx1"/>
                 </a:solidFill>
@@ -4801,7 +4088,7 @@
               <a:t>onresolutionsetting</a:t>
             </a:r>
             <a:r>
-              <a:rPr lang="ko-KR" altLang="en-US" sz="1100" dirty="0" smtClean="0">
+              <a:rPr lang="ko-KR" altLang="en-US" sz="1100" dirty="0">
                 <a:solidFill>
                   <a:schemeClr val="tx1"/>
                 </a:solidFill>
@@ -4809,7 +4096,7 @@
               <a:t>(</a:t>
             </a:r>
             <a:r>
-              <a:rPr lang="ko-KR" altLang="en-US" sz="1100" dirty="0" err="1" smtClean="0">
+              <a:rPr lang="ko-KR" altLang="en-US" sz="1100" dirty="0" err="1">
                 <a:solidFill>
                   <a:schemeClr val="tx1"/>
                 </a:solidFill>
@@ -4817,18 +4104,13 @@
               <a:t>event</a:t>
             </a:r>
             <a:r>
-              <a:rPr lang="ko-KR" altLang="en-US" sz="1100" dirty="0" smtClean="0">
+              <a:rPr lang="ko-KR" altLang="en-US" sz="1100" dirty="0">
                 <a:solidFill>
                   <a:schemeClr val="tx1"/>
                 </a:solidFill>
               </a:rPr>
               <a:t>);</a:t>
             </a:r>
-            <a:endParaRPr lang="ko-KR" altLang="en-US" sz="1100" dirty="0">
-              <a:solidFill>
-                <a:schemeClr val="tx1"/>
-              </a:solidFill>
-            </a:endParaRPr>
           </a:p>
         </p:txBody>
       </p:sp>
@@ -4972,15 +4254,15 @@
           <a:lstStyle/>
           <a:p>
             <a:r>
-              <a:rPr lang="en-US" altLang="ko-KR" sz="1000" dirty="0" smtClean="0"/>
+              <a:rPr lang="en-US" altLang="ko-KR" sz="1000" dirty="0"/>
               <a:t>(</a:t>
             </a:r>
             <a:r>
-              <a:rPr lang="en-US" altLang="ko-KR" sz="1000" dirty="0" err="1" smtClean="0"/>
+              <a:rPr lang="en-US" altLang="ko-KR" sz="1000" dirty="0" err="1"/>
               <a:t>allinput</a:t>
             </a:r>
             <a:r>
-              <a:rPr lang="en-US" altLang="ko-KR" sz="1000" dirty="0" smtClean="0"/>
+              <a:rPr lang="en-US" altLang="ko-KR" sz="1000" dirty="0"/>
               <a:t>)</a:t>
             </a:r>
             <a:endParaRPr lang="ko-KR" altLang="en-US" sz="1000" dirty="0"/>
@@ -5024,7 +4306,7 @@
           <a:lstStyle/>
           <a:p>
             <a:r>
-              <a:rPr lang="ko-KR" altLang="en-US" sz="1100" dirty="0" err="1" smtClean="0">
+              <a:rPr lang="ko-KR" altLang="en-US" sz="1100" dirty="0" err="1">
                 <a:solidFill>
                   <a:schemeClr val="tx1"/>
                 </a:solidFill>
@@ -5032,7 +4314,7 @@
               <a:t>set</a:t>
             </a:r>
             <a:r>
-              <a:rPr lang="en-US" altLang="ko-KR" sz="1100" dirty="0" smtClean="0">
+              <a:rPr lang="en-US" altLang="ko-KR" sz="1100" dirty="0">
                 <a:solidFill>
                   <a:schemeClr val="tx1"/>
                 </a:solidFill>
@@ -5040,7 +4322,7 @@
               <a:t>stream</a:t>
             </a:r>
             <a:r>
-              <a:rPr lang="ko-KR" altLang="en-US" sz="1100" dirty="0" smtClean="0">
+              <a:rPr lang="ko-KR" altLang="en-US" sz="1100" dirty="0">
                 <a:solidFill>
                   <a:schemeClr val="tx1"/>
                 </a:solidFill>
@@ -5048,7 +4330,7 @@
               <a:t>(</a:t>
             </a:r>
             <a:r>
-              <a:rPr lang="en-US" altLang="ko-KR" sz="1100" dirty="0" smtClean="0">
+              <a:rPr lang="en-US" altLang="ko-KR" sz="1100" dirty="0">
                 <a:solidFill>
                   <a:schemeClr val="tx1"/>
                 </a:solidFill>
@@ -5056,18 +4338,13 @@
               <a:t>stream</a:t>
             </a:r>
             <a:r>
-              <a:rPr lang="ko-KR" altLang="en-US" sz="1100" dirty="0" smtClean="0">
+              <a:rPr lang="ko-KR" altLang="en-US" sz="1100" dirty="0">
                 <a:solidFill>
                   <a:schemeClr val="tx1"/>
                 </a:solidFill>
               </a:rPr>
               <a:t>);</a:t>
             </a:r>
-            <a:endParaRPr lang="ko-KR" altLang="en-US" sz="1100" dirty="0">
-              <a:solidFill>
-                <a:schemeClr val="tx1"/>
-              </a:solidFill>
-            </a:endParaRPr>
           </a:p>
         </p:txBody>
       </p:sp>
@@ -5131,7 +4408,7 @@
           <a:lstStyle/>
           <a:p>
             <a:r>
-              <a:rPr lang="en-US" altLang="ko-KR" sz="1000" dirty="0" smtClean="0"/>
+              <a:rPr lang="en-US" altLang="ko-KR" sz="1000" dirty="0"/>
               <a:t>(stream)</a:t>
             </a:r>
             <a:endParaRPr lang="ko-KR" altLang="en-US" sz="1000" dirty="0"/>
@@ -5176,161 +4453,6 @@
           </a:fontRef>
         </p:style>
       </p:cxnSp>
-      <p:sp>
-        <p:nvSpPr>
-          <p:cNvPr id="68" name="한쪽 모서리는 잘리고 다른 쪽 모서리는 둥근 사각형 67"/>
-          <p:cNvSpPr/>
-          <p:nvPr/>
-        </p:nvSpPr>
-        <p:spPr>
-          <a:xfrm>
-            <a:off x="6402568" y="3212889"/>
-            <a:ext cx="793987" cy="256970"/>
-          </a:xfrm>
-          <a:prstGeom prst="snipRoundRect">
-            <a:avLst/>
-          </a:prstGeom>
-          <a:noFill/>
-        </p:spPr>
-        <p:style>
-          <a:lnRef idx="2">
-            <a:schemeClr val="accent1">
-              <a:shade val="50000"/>
-            </a:schemeClr>
-          </a:lnRef>
-          <a:fillRef idx="1">
-            <a:schemeClr val="accent1"/>
-          </a:fillRef>
-          <a:effectRef idx="0">
-            <a:schemeClr val="accent1"/>
-          </a:effectRef>
-          <a:fontRef idx="minor">
-            <a:schemeClr val="lt1"/>
-          </a:fontRef>
-        </p:style>
-        <p:txBody>
-          <a:bodyPr rtlCol="0" anchor="ctr"/>
-          <a:lstStyle/>
-          <a:p>
-            <a:pPr algn="ctr"/>
-            <a:r>
-              <a:rPr lang="en-US" altLang="ko-KR" sz="1050" dirty="0" smtClean="0">
-                <a:solidFill>
-                  <a:schemeClr val="tx1"/>
-                </a:solidFill>
-              </a:rPr>
-              <a:t>enables</a:t>
-            </a:r>
-            <a:endParaRPr lang="ko-KR" altLang="en-US" sz="1050" dirty="0">
-              <a:solidFill>
-                <a:schemeClr val="tx1"/>
-              </a:solidFill>
-            </a:endParaRPr>
-          </a:p>
-        </p:txBody>
-      </p:sp>
-      <p:cxnSp>
-        <p:nvCxnSpPr>
-          <p:cNvPr id="71" name="직선 화살표 연결선 70"/>
-          <p:cNvCxnSpPr>
-            <a:stCxn id="54" idx="2"/>
-            <a:endCxn id="68" idx="3"/>
-          </p:cNvCxnSpPr>
-          <p:nvPr/>
-        </p:nvCxnSpPr>
-        <p:spPr>
-          <a:xfrm>
-            <a:off x="6789403" y="2848071"/>
-            <a:ext cx="10159" cy="364818"/>
-          </a:xfrm>
-          <a:prstGeom prst="straightConnector1">
-            <a:avLst/>
-          </a:prstGeom>
-          <a:ln>
-            <a:tailEnd type="triangle"/>
-          </a:ln>
-        </p:spPr>
-        <p:style>
-          <a:lnRef idx="1">
-            <a:schemeClr val="accent1"/>
-          </a:lnRef>
-          <a:fillRef idx="0">
-            <a:schemeClr val="accent1"/>
-          </a:fillRef>
-          <a:effectRef idx="0">
-            <a:schemeClr val="accent1"/>
-          </a:effectRef>
-          <a:fontRef idx="minor">
-            <a:schemeClr val="tx1"/>
-          </a:fontRef>
-        </p:style>
-      </p:cxnSp>
-      <p:cxnSp>
-        <p:nvCxnSpPr>
-          <p:cNvPr id="77" name="꺾인 연결선 76"/>
-          <p:cNvCxnSpPr>
-            <a:stCxn id="68" idx="0"/>
-            <a:endCxn id="21" idx="0"/>
-          </p:cNvCxnSpPr>
-          <p:nvPr/>
-        </p:nvCxnSpPr>
-        <p:spPr>
-          <a:xfrm>
-            <a:off x="7196555" y="3341374"/>
-            <a:ext cx="1332221" cy="420597"/>
-          </a:xfrm>
-          <a:prstGeom prst="bentConnector2">
-            <a:avLst/>
-          </a:prstGeom>
-          <a:ln>
-            <a:tailEnd type="triangle"/>
-          </a:ln>
-        </p:spPr>
-        <p:style>
-          <a:lnRef idx="1">
-            <a:schemeClr val="accent1"/>
-          </a:lnRef>
-          <a:fillRef idx="0">
-            <a:schemeClr val="accent1"/>
-          </a:fillRef>
-          <a:effectRef idx="0">
-            <a:schemeClr val="accent1"/>
-          </a:effectRef>
-          <a:fontRef idx="minor">
-            <a:schemeClr val="tx1"/>
-          </a:fontRef>
-        </p:style>
-      </p:cxnSp>
-      <p:sp>
-        <p:nvSpPr>
-          <p:cNvPr id="85" name="TextBox 84"/>
-          <p:cNvSpPr txBox="1"/>
-          <p:nvPr/>
-        </p:nvSpPr>
-        <p:spPr>
-          <a:xfrm>
-            <a:off x="7204479" y="3383493"/>
-            <a:ext cx="449162" cy="246221"/>
-          </a:xfrm>
-          <a:prstGeom prst="rect">
-            <a:avLst/>
-          </a:prstGeom>
-          <a:noFill/>
-        </p:spPr>
-        <p:txBody>
-          <a:bodyPr wrap="none" rtlCol="0">
-            <a:spAutoFit/>
-          </a:bodyPr>
-          <a:lstStyle/>
-          <a:p>
-            <a:r>
-              <a:rPr lang="en-US" altLang="ko-KR" sz="1000" dirty="0" smtClean="0"/>
-              <a:t>false</a:t>
-            </a:r>
-            <a:endParaRPr lang="ko-KR" altLang="en-US" sz="1000" dirty="0"/>
-          </a:p>
-        </p:txBody>
-      </p:sp>
       <p:cxnSp>
         <p:nvCxnSpPr>
           <p:cNvPr id="93" name="직선 화살표 연결선 92"/>
@@ -5491,7 +4613,7 @@
         </p:nvSpPr>
         <p:spPr>
           <a:xfrm>
-            <a:off x="8009980" y="2466106"/>
+            <a:off x="8312219" y="2462451"/>
             <a:ext cx="1103673" cy="537295"/>
           </a:xfrm>
           <a:prstGeom prst="ellipse">
@@ -5521,7 +4643,7 @@
           <a:p>
             <a:pPr algn="ctr"/>
             <a:r>
-              <a:rPr lang="en-US" altLang="ko-KR" sz="1000" dirty="0" smtClean="0">
+              <a:rPr lang="en-US" altLang="ko-KR" sz="1000" dirty="0">
                 <a:solidFill>
                   <a:schemeClr val="tx1"/>
                 </a:solidFill>
@@ -5532,7 +4654,7 @@
           <a:p>
             <a:pPr algn="ctr"/>
             <a:r>
-              <a:rPr lang="en-US" altLang="ko-KR" sz="1000" dirty="0" smtClean="0">
+              <a:rPr lang="en-US" altLang="ko-KR" sz="1000" dirty="0">
                 <a:solidFill>
                   <a:schemeClr val="tx1"/>
                 </a:solidFill>
@@ -5557,9 +4679,9 @@
           <p:nvPr/>
         </p:nvCxnSpPr>
         <p:spPr>
-          <a:xfrm flipH="1" flipV="1">
+          <a:xfrm flipH="1">
             <a:off x="7511386" y="2731099"/>
-            <a:ext cx="498594" cy="3655"/>
+            <a:ext cx="800833" cy="0"/>
           </a:xfrm>
           <a:prstGeom prst="straightConnector1">
             <a:avLst/>
@@ -5732,7 +4854,7 @@
           <a:lstStyle/>
           <a:p>
             <a:r>
-              <a:rPr lang="en-US" altLang="ko-KR" sz="1100" dirty="0" err="1" smtClean="0">
+              <a:rPr lang="en-US" altLang="ko-KR" sz="1100" dirty="0" err="1">
                 <a:solidFill>
                   <a:schemeClr val="tx1"/>
                 </a:solidFill>
@@ -5967,7 +5089,7 @@
           <a:lstStyle/>
           <a:p>
             <a:r>
-              <a:rPr lang="ko-KR" altLang="en-US" sz="1100" dirty="0" err="1" smtClean="0">
+              <a:rPr lang="ko-KR" altLang="en-US" sz="1100" dirty="0" err="1">
                 <a:solidFill>
                   <a:schemeClr val="tx1"/>
                 </a:solidFill>
@@ -5975,7 +5097,7 @@
               <a:t>afterOpenOrJoin</a:t>
             </a:r>
             <a:r>
-              <a:rPr lang="ko-KR" altLang="en-US" sz="1100" dirty="0" smtClean="0">
+              <a:rPr lang="ko-KR" altLang="en-US" sz="1100" dirty="0">
                 <a:solidFill>
                   <a:schemeClr val="tx1"/>
                 </a:solidFill>
@@ -5983,7 +5105,7 @@
               <a:t>(</a:t>
             </a:r>
             <a:r>
-              <a:rPr lang="ko-KR" altLang="en-US" sz="1100" dirty="0" err="1" smtClean="0">
+              <a:rPr lang="ko-KR" altLang="en-US" sz="1100" dirty="0" err="1">
                 <a:solidFill>
                   <a:schemeClr val="tx1"/>
                 </a:solidFill>
@@ -5991,18 +5113,13 @@
               <a:t>stream</a:t>
             </a:r>
             <a:r>
-              <a:rPr lang="ko-KR" altLang="en-US" sz="1100" dirty="0" smtClean="0">
+              <a:rPr lang="ko-KR" altLang="en-US" sz="1100" dirty="0">
                 <a:solidFill>
                   <a:schemeClr val="tx1"/>
                 </a:solidFill>
               </a:rPr>
               <a:t>);</a:t>
             </a:r>
-            <a:endParaRPr lang="ko-KR" altLang="en-US" sz="1100" dirty="0">
-              <a:solidFill>
-                <a:schemeClr val="tx1"/>
-              </a:solidFill>
-            </a:endParaRPr>
           </a:p>
         </p:txBody>
       </p:sp>
@@ -6066,7 +5183,7 @@
           <a:lstStyle/>
           <a:p>
             <a:r>
-              <a:rPr lang="en-US" altLang="ko-KR" sz="1000" dirty="0" smtClean="0"/>
+              <a:rPr lang="en-US" altLang="ko-KR" sz="1000" dirty="0"/>
               <a:t>(kind)</a:t>
             </a:r>
             <a:endParaRPr lang="ko-KR" altLang="en-US" sz="1000" dirty="0"/>
@@ -6096,7 +5213,7 @@
           <a:lstStyle/>
           <a:p>
             <a:r>
-              <a:rPr lang="en-US" altLang="ko-KR" sz="1000" dirty="0" smtClean="0"/>
+              <a:rPr lang="en-US" altLang="ko-KR" sz="1000" dirty="0"/>
               <a:t>(stream)</a:t>
             </a:r>
             <a:endParaRPr lang="ko-KR" altLang="en-US" sz="1000" dirty="0"/>
@@ -6126,7 +5243,7 @@
           <a:lstStyle/>
           <a:p>
             <a:r>
-              <a:rPr lang="en-US" altLang="ko-KR" sz="1000" dirty="0" smtClean="0"/>
+              <a:rPr lang="en-US" altLang="ko-KR" sz="1000" dirty="0"/>
               <a:t>(stream)</a:t>
             </a:r>
             <a:endParaRPr lang="ko-KR" altLang="en-US" sz="1000" dirty="0"/>
@@ -6156,7 +5273,7 @@
           <a:lstStyle/>
           <a:p>
             <a:r>
-              <a:rPr lang="en-US" altLang="ko-KR" sz="1000" dirty="0" smtClean="0"/>
+              <a:rPr lang="en-US" altLang="ko-KR" sz="1000" dirty="0"/>
               <a:t>(stream)</a:t>
             </a:r>
             <a:endParaRPr lang="ko-KR" altLang="en-US" sz="1000" dirty="0"/>
@@ -6211,6 +5328,608 @@
           <a:xfrm rot="16200000" flipV="1">
             <a:off x="2983015" y="4235098"/>
             <a:ext cx="551356" cy="251213"/>
+          </a:xfrm>
+          <a:prstGeom prst="bentConnector2">
+            <a:avLst/>
+          </a:prstGeom>
+          <a:ln>
+            <a:tailEnd type="triangle"/>
+          </a:ln>
+        </p:spPr>
+        <p:style>
+          <a:lnRef idx="1">
+            <a:schemeClr val="accent1"/>
+          </a:lnRef>
+          <a:fillRef idx="0">
+            <a:schemeClr val="accent1"/>
+          </a:fillRef>
+          <a:effectRef idx="0">
+            <a:schemeClr val="accent1"/>
+          </a:effectRef>
+          <a:fontRef idx="minor">
+            <a:schemeClr val="tx1"/>
+          </a:fontRef>
+        </p:style>
+      </p:cxnSp>
+      <p:cxnSp>
+        <p:nvCxnSpPr>
+          <p:cNvPr id="4" name="연결선: 꺾임 3">
+            <a:extLst>
+              <a:ext uri="{FF2B5EF4-FFF2-40B4-BE49-F238E27FC236}">
+                <a16:creationId xmlns:a16="http://schemas.microsoft.com/office/drawing/2014/main" id="{900262E0-4A97-443A-BE09-3BC76875F24E}"/>
+              </a:ext>
+            </a:extLst>
+          </p:cNvPr>
+          <p:cNvCxnSpPr>
+            <a:stCxn id="54" idx="2"/>
+            <a:endCxn id="21" idx="0"/>
+          </p:cNvCxnSpPr>
+          <p:nvPr/>
+        </p:nvCxnSpPr>
+        <p:spPr>
+          <a:xfrm rot="16200000" flipH="1">
+            <a:off x="6671780" y="2965694"/>
+            <a:ext cx="511965" cy="276718"/>
+          </a:xfrm>
+          <a:prstGeom prst="bentConnector3">
+            <a:avLst/>
+          </a:prstGeom>
+          <a:ln>
+            <a:tailEnd type="triangle"/>
+          </a:ln>
+        </p:spPr>
+        <p:style>
+          <a:lnRef idx="1">
+            <a:schemeClr val="accent1"/>
+          </a:lnRef>
+          <a:fillRef idx="0">
+            <a:schemeClr val="accent1"/>
+          </a:fillRef>
+          <a:effectRef idx="0">
+            <a:schemeClr val="accent1"/>
+          </a:effectRef>
+          <a:fontRef idx="minor">
+            <a:schemeClr val="tx1"/>
+          </a:fontRef>
+        </p:style>
+      </p:cxnSp>
+      <p:sp>
+        <p:nvSpPr>
+          <p:cNvPr id="57" name="직사각형 56">
+            <a:extLst>
+              <a:ext uri="{FF2B5EF4-FFF2-40B4-BE49-F238E27FC236}">
+                <a16:creationId xmlns:a16="http://schemas.microsoft.com/office/drawing/2014/main" id="{37E1B12C-47C7-44DF-9925-1F9F2E4E49AE}"/>
+              </a:ext>
+            </a:extLst>
+          </p:cNvPr>
+          <p:cNvSpPr/>
+          <p:nvPr/>
+        </p:nvSpPr>
+        <p:spPr>
+          <a:xfrm>
+            <a:off x="8263937" y="3419190"/>
+            <a:ext cx="1294666" cy="233944"/>
+          </a:xfrm>
+          <a:prstGeom prst="rect">
+            <a:avLst/>
+          </a:prstGeom>
+          <a:noFill/>
+        </p:spPr>
+        <p:style>
+          <a:lnRef idx="2">
+            <a:schemeClr val="accent1">
+              <a:shade val="50000"/>
+            </a:schemeClr>
+          </a:lnRef>
+          <a:fillRef idx="1">
+            <a:schemeClr val="accent1"/>
+          </a:fillRef>
+          <a:effectRef idx="0">
+            <a:schemeClr val="accent1"/>
+          </a:effectRef>
+          <a:fontRef idx="minor">
+            <a:schemeClr val="lt1"/>
+          </a:fontRef>
+        </p:style>
+        <p:txBody>
+          <a:bodyPr rtlCol="0" anchor="ctr"/>
+          <a:lstStyle/>
+          <a:p>
+            <a:r>
+              <a:rPr lang="en-US" altLang="ko-KR" sz="1100" dirty="0" err="1">
+                <a:solidFill>
+                  <a:schemeClr val="tx1"/>
+                </a:solidFill>
+              </a:rPr>
+              <a:t>msrStart</a:t>
+            </a:r>
+            <a:r>
+              <a:rPr lang="ko-KR" altLang="en-US" sz="1100" dirty="0">
+                <a:solidFill>
+                  <a:schemeClr val="tx1"/>
+                </a:solidFill>
+              </a:rPr>
+              <a:t>(</a:t>
+            </a:r>
+            <a:r>
+              <a:rPr lang="en-US" altLang="ko-KR" sz="1100" dirty="0">
+                <a:solidFill>
+                  <a:schemeClr val="tx1"/>
+                </a:solidFill>
+              </a:rPr>
+              <a:t>streams</a:t>
+            </a:r>
+            <a:r>
+              <a:rPr lang="ko-KR" altLang="en-US" sz="1100" dirty="0">
+                <a:solidFill>
+                  <a:schemeClr val="tx1"/>
+                </a:solidFill>
+              </a:rPr>
+              <a:t>);</a:t>
+            </a:r>
+          </a:p>
+        </p:txBody>
+      </p:sp>
+      <p:sp>
+        <p:nvSpPr>
+          <p:cNvPr id="62" name="직사각형 61">
+            <a:extLst>
+              <a:ext uri="{FF2B5EF4-FFF2-40B4-BE49-F238E27FC236}">
+                <a16:creationId xmlns:a16="http://schemas.microsoft.com/office/drawing/2014/main" id="{9F329F44-F0FD-4410-8BBB-EF18DDE4CC5E}"/>
+              </a:ext>
+            </a:extLst>
+          </p:cNvPr>
+          <p:cNvSpPr/>
+          <p:nvPr/>
+        </p:nvSpPr>
+        <p:spPr>
+          <a:xfrm>
+            <a:off x="10052190" y="2614127"/>
+            <a:ext cx="1294666" cy="233944"/>
+          </a:xfrm>
+          <a:prstGeom prst="rect">
+            <a:avLst/>
+          </a:prstGeom>
+          <a:noFill/>
+        </p:spPr>
+        <p:style>
+          <a:lnRef idx="2">
+            <a:schemeClr val="accent1">
+              <a:shade val="50000"/>
+            </a:schemeClr>
+          </a:lnRef>
+          <a:fillRef idx="1">
+            <a:schemeClr val="accent1"/>
+          </a:fillRef>
+          <a:effectRef idx="0">
+            <a:schemeClr val="accent1"/>
+          </a:effectRef>
+          <a:fontRef idx="minor">
+            <a:schemeClr val="lt1"/>
+          </a:fontRef>
+        </p:style>
+        <p:txBody>
+          <a:bodyPr rtlCol="0" anchor="ctr"/>
+          <a:lstStyle/>
+          <a:p>
+            <a:r>
+              <a:rPr lang="en-US" altLang="ko-KR" sz="1100" dirty="0">
+                <a:solidFill>
+                  <a:schemeClr val="tx1"/>
+                </a:solidFill>
+              </a:rPr>
+              <a:t>ended</a:t>
+            </a:r>
+            <a:r>
+              <a:rPr lang="ko-KR" altLang="en-US" sz="1100" dirty="0">
+                <a:solidFill>
+                  <a:schemeClr val="tx1"/>
+                </a:solidFill>
+              </a:rPr>
+              <a:t>(</a:t>
+            </a:r>
+            <a:r>
+              <a:rPr lang="en-US" altLang="ko-KR" sz="1100" dirty="0">
+                <a:solidFill>
+                  <a:schemeClr val="tx1"/>
+                </a:solidFill>
+              </a:rPr>
+              <a:t>event</a:t>
+            </a:r>
+            <a:r>
+              <a:rPr lang="ko-KR" altLang="en-US" sz="1100" dirty="0">
+                <a:solidFill>
+                  <a:schemeClr val="tx1"/>
+                </a:solidFill>
+              </a:rPr>
+              <a:t>);</a:t>
+            </a:r>
+          </a:p>
+        </p:txBody>
+      </p:sp>
+      <p:cxnSp>
+        <p:nvCxnSpPr>
+          <p:cNvPr id="27" name="직선 화살표 연결선 26">
+            <a:extLst>
+              <a:ext uri="{FF2B5EF4-FFF2-40B4-BE49-F238E27FC236}">
+                <a16:creationId xmlns:a16="http://schemas.microsoft.com/office/drawing/2014/main" id="{CFCC351D-F3B0-457C-BA4D-5E418DA821C4}"/>
+              </a:ext>
+            </a:extLst>
+          </p:cNvPr>
+          <p:cNvCxnSpPr>
+            <a:stCxn id="105" idx="6"/>
+            <a:endCxn id="62" idx="1"/>
+          </p:cNvCxnSpPr>
+          <p:nvPr/>
+        </p:nvCxnSpPr>
+        <p:spPr>
+          <a:xfrm>
+            <a:off x="9415892" y="2731099"/>
+            <a:ext cx="636298" cy="0"/>
+          </a:xfrm>
+          <a:prstGeom prst="straightConnector1">
+            <a:avLst/>
+          </a:prstGeom>
+          <a:ln>
+            <a:tailEnd type="triangle"/>
+          </a:ln>
+        </p:spPr>
+        <p:style>
+          <a:lnRef idx="1">
+            <a:schemeClr val="accent1"/>
+          </a:lnRef>
+          <a:fillRef idx="0">
+            <a:schemeClr val="accent1"/>
+          </a:fillRef>
+          <a:effectRef idx="0">
+            <a:schemeClr val="accent1"/>
+          </a:effectRef>
+          <a:fontRef idx="minor">
+            <a:schemeClr val="tx1"/>
+          </a:fontRef>
+        </p:style>
+      </p:cxnSp>
+      <p:sp>
+        <p:nvSpPr>
+          <p:cNvPr id="66" name="직사각형 65">
+            <a:extLst>
+              <a:ext uri="{FF2B5EF4-FFF2-40B4-BE49-F238E27FC236}">
+                <a16:creationId xmlns:a16="http://schemas.microsoft.com/office/drawing/2014/main" id="{FE7F4AB9-BCE5-4591-B2F5-AA6DB609DBB2}"/>
+              </a:ext>
+            </a:extLst>
+          </p:cNvPr>
+          <p:cNvSpPr/>
+          <p:nvPr/>
+        </p:nvSpPr>
+        <p:spPr>
+          <a:xfrm>
+            <a:off x="8422193" y="3952328"/>
+            <a:ext cx="883723" cy="233944"/>
+          </a:xfrm>
+          <a:prstGeom prst="rect">
+            <a:avLst/>
+          </a:prstGeom>
+          <a:noFill/>
+        </p:spPr>
+        <p:style>
+          <a:lnRef idx="2">
+            <a:schemeClr val="accent1">
+              <a:shade val="50000"/>
+            </a:schemeClr>
+          </a:lnRef>
+          <a:fillRef idx="1">
+            <a:schemeClr val="accent1"/>
+          </a:fillRef>
+          <a:effectRef idx="0">
+            <a:schemeClr val="accent1"/>
+          </a:effectRef>
+          <a:fontRef idx="minor">
+            <a:schemeClr val="lt1"/>
+          </a:fontRef>
+        </p:style>
+        <p:txBody>
+          <a:bodyPr rtlCol="0" anchor="ctr"/>
+          <a:lstStyle/>
+          <a:p>
+            <a:r>
+              <a:rPr lang="en-US" altLang="ko-KR" sz="1100" dirty="0" err="1">
+                <a:solidFill>
+                  <a:schemeClr val="tx1"/>
+                </a:solidFill>
+              </a:rPr>
+              <a:t>msrStop</a:t>
+            </a:r>
+            <a:r>
+              <a:rPr lang="ko-KR" altLang="en-US" sz="1100" dirty="0">
+                <a:solidFill>
+                  <a:schemeClr val="tx1"/>
+                </a:solidFill>
+              </a:rPr>
+              <a:t>();</a:t>
+            </a:r>
+          </a:p>
+        </p:txBody>
+      </p:sp>
+      <p:cxnSp>
+        <p:nvCxnSpPr>
+          <p:cNvPr id="29" name="직선 화살표 연결선 28">
+            <a:extLst>
+              <a:ext uri="{FF2B5EF4-FFF2-40B4-BE49-F238E27FC236}">
+                <a16:creationId xmlns:a16="http://schemas.microsoft.com/office/drawing/2014/main" id="{2A8B34BD-CC6F-40C7-96A5-668D7091CCD5}"/>
+              </a:ext>
+            </a:extLst>
+          </p:cNvPr>
+          <p:cNvCxnSpPr>
+            <a:cxnSpLocks/>
+            <a:stCxn id="62" idx="2"/>
+            <a:endCxn id="66" idx="3"/>
+          </p:cNvCxnSpPr>
+          <p:nvPr/>
+        </p:nvCxnSpPr>
+        <p:spPr>
+          <a:xfrm rot="5400000">
+            <a:off x="9392106" y="2761882"/>
+            <a:ext cx="1221229" cy="1393607"/>
+          </a:xfrm>
+          <a:prstGeom prst="bentConnector2">
+            <a:avLst/>
+          </a:prstGeom>
+          <a:ln>
+            <a:tailEnd type="triangle"/>
+          </a:ln>
+        </p:spPr>
+        <p:style>
+          <a:lnRef idx="1">
+            <a:schemeClr val="accent1"/>
+          </a:lnRef>
+          <a:fillRef idx="0">
+            <a:schemeClr val="accent1"/>
+          </a:fillRef>
+          <a:effectRef idx="0">
+            <a:schemeClr val="accent1"/>
+          </a:effectRef>
+          <a:fontRef idx="minor">
+            <a:schemeClr val="tx1"/>
+          </a:fontRef>
+        </p:style>
+      </p:cxnSp>
+      <p:cxnSp>
+        <p:nvCxnSpPr>
+          <p:cNvPr id="45" name="직선 화살표 연결선 44">
+            <a:extLst>
+              <a:ext uri="{FF2B5EF4-FFF2-40B4-BE49-F238E27FC236}">
+                <a16:creationId xmlns:a16="http://schemas.microsoft.com/office/drawing/2014/main" id="{B318600A-0D05-4D85-A409-769AB1702BCF}"/>
+              </a:ext>
+            </a:extLst>
+          </p:cNvPr>
+          <p:cNvCxnSpPr>
+            <a:stCxn id="54" idx="3"/>
+            <a:endCxn id="57" idx="0"/>
+          </p:cNvCxnSpPr>
+          <p:nvPr/>
+        </p:nvCxnSpPr>
+        <p:spPr>
+          <a:xfrm>
+            <a:off x="7511386" y="2731099"/>
+            <a:ext cx="1399884" cy="688091"/>
+          </a:xfrm>
+          <a:prstGeom prst="straightConnector1">
+            <a:avLst/>
+          </a:prstGeom>
+          <a:ln>
+            <a:tailEnd type="triangle"/>
+          </a:ln>
+        </p:spPr>
+        <p:style>
+          <a:lnRef idx="1">
+            <a:schemeClr val="accent1"/>
+          </a:lnRef>
+          <a:fillRef idx="0">
+            <a:schemeClr val="accent1"/>
+          </a:fillRef>
+          <a:effectRef idx="0">
+            <a:schemeClr val="accent1"/>
+          </a:effectRef>
+          <a:fontRef idx="minor">
+            <a:schemeClr val="tx1"/>
+          </a:fontRef>
+        </p:style>
+      </p:cxnSp>
+      <p:sp>
+        <p:nvSpPr>
+          <p:cNvPr id="81" name="직사각형 80">
+            <a:extLst>
+              <a:ext uri="{FF2B5EF4-FFF2-40B4-BE49-F238E27FC236}">
+                <a16:creationId xmlns:a16="http://schemas.microsoft.com/office/drawing/2014/main" id="{F7C14E8B-F04E-4CDB-9B71-1DF12B4496A5}"/>
+              </a:ext>
+            </a:extLst>
+          </p:cNvPr>
+          <p:cNvSpPr/>
+          <p:nvPr/>
+        </p:nvSpPr>
+        <p:spPr>
+          <a:xfrm>
+            <a:off x="2741729" y="5489910"/>
+            <a:ext cx="1320989" cy="242444"/>
+          </a:xfrm>
+          <a:prstGeom prst="rect">
+            <a:avLst/>
+          </a:prstGeom>
+          <a:noFill/>
+        </p:spPr>
+        <p:style>
+          <a:lnRef idx="2">
+            <a:schemeClr val="accent1">
+              <a:shade val="50000"/>
+            </a:schemeClr>
+          </a:lnRef>
+          <a:fillRef idx="1">
+            <a:schemeClr val="accent1"/>
+          </a:fillRef>
+          <a:effectRef idx="0">
+            <a:schemeClr val="accent1"/>
+          </a:effectRef>
+          <a:fontRef idx="minor">
+            <a:schemeClr val="lt1"/>
+          </a:fontRef>
+        </p:style>
+        <p:txBody>
+          <a:bodyPr rtlCol="0" anchor="ctr"/>
+          <a:lstStyle/>
+          <a:p>
+            <a:r>
+              <a:rPr lang="en-US" altLang="ko-KR" sz="1100" dirty="0" err="1">
+                <a:solidFill>
+                  <a:schemeClr val="tx1"/>
+                </a:solidFill>
+              </a:rPr>
+              <a:t>canvasSetting</a:t>
+            </a:r>
+            <a:r>
+              <a:rPr lang="en-US" altLang="ko-KR" sz="1100" dirty="0">
+                <a:solidFill>
+                  <a:schemeClr val="tx1"/>
+                </a:solidFill>
+              </a:rPr>
+              <a:t>();</a:t>
+            </a:r>
+            <a:endParaRPr lang="ko-KR" altLang="en-US" sz="1100" dirty="0">
+              <a:solidFill>
+                <a:schemeClr val="tx1"/>
+              </a:solidFill>
+            </a:endParaRPr>
+          </a:p>
+        </p:txBody>
+      </p:sp>
+      <p:sp>
+        <p:nvSpPr>
+          <p:cNvPr id="82" name="직사각형 81">
+            <a:extLst>
+              <a:ext uri="{FF2B5EF4-FFF2-40B4-BE49-F238E27FC236}">
+                <a16:creationId xmlns:a16="http://schemas.microsoft.com/office/drawing/2014/main" id="{0E0A919B-2084-4E64-A716-ADB619F1B850}"/>
+              </a:ext>
+            </a:extLst>
+          </p:cNvPr>
+          <p:cNvSpPr/>
+          <p:nvPr/>
+        </p:nvSpPr>
+        <p:spPr>
+          <a:xfrm>
+            <a:off x="2741729" y="5985857"/>
+            <a:ext cx="1320989" cy="242444"/>
+          </a:xfrm>
+          <a:prstGeom prst="rect">
+            <a:avLst/>
+          </a:prstGeom>
+          <a:noFill/>
+        </p:spPr>
+        <p:style>
+          <a:lnRef idx="2">
+            <a:schemeClr val="accent1">
+              <a:shade val="50000"/>
+            </a:schemeClr>
+          </a:lnRef>
+          <a:fillRef idx="1">
+            <a:schemeClr val="accent1"/>
+          </a:fillRef>
+          <a:effectRef idx="0">
+            <a:schemeClr val="accent1"/>
+          </a:effectRef>
+          <a:fontRef idx="minor">
+            <a:schemeClr val="lt1"/>
+          </a:fontRef>
+        </p:style>
+        <p:txBody>
+          <a:bodyPr rtlCol="0" anchor="ctr"/>
+          <a:lstStyle/>
+          <a:p>
+            <a:r>
+              <a:rPr lang="en-US" altLang="ko-KR" sz="1100" dirty="0" err="1">
+                <a:solidFill>
+                  <a:schemeClr val="tx1"/>
+                </a:solidFill>
+              </a:rPr>
+              <a:t>fileShareSetting</a:t>
+            </a:r>
+            <a:r>
+              <a:rPr lang="en-US" altLang="ko-KR" sz="1100" dirty="0">
+                <a:solidFill>
+                  <a:schemeClr val="tx1"/>
+                </a:solidFill>
+              </a:rPr>
+              <a:t>();</a:t>
+            </a:r>
+            <a:endParaRPr lang="ko-KR" altLang="en-US" sz="1100" dirty="0">
+              <a:solidFill>
+                <a:schemeClr val="tx1"/>
+              </a:solidFill>
+            </a:endParaRPr>
+          </a:p>
+        </p:txBody>
+      </p:sp>
+      <p:cxnSp>
+        <p:nvCxnSpPr>
+          <p:cNvPr id="48" name="연결선: 꺾임 47">
+            <a:extLst>
+              <a:ext uri="{FF2B5EF4-FFF2-40B4-BE49-F238E27FC236}">
+                <a16:creationId xmlns:a16="http://schemas.microsoft.com/office/drawing/2014/main" id="{EA371E65-9DFE-4E02-87A6-501868B95FE6}"/>
+              </a:ext>
+            </a:extLst>
+          </p:cNvPr>
+          <p:cNvCxnSpPr>
+            <a:cxnSpLocks/>
+            <a:stCxn id="13" idx="2"/>
+            <a:endCxn id="81" idx="3"/>
+          </p:cNvCxnSpPr>
+          <p:nvPr/>
+        </p:nvCxnSpPr>
+        <p:spPr>
+          <a:xfrm rot="5400000">
+            <a:off x="3127763" y="4475367"/>
+            <a:ext cx="2070720" cy="200810"/>
+          </a:xfrm>
+          <a:prstGeom prst="bentConnector2">
+            <a:avLst/>
+          </a:prstGeom>
+          <a:ln>
+            <a:tailEnd type="triangle"/>
+          </a:ln>
+        </p:spPr>
+        <p:style>
+          <a:lnRef idx="1">
+            <a:schemeClr val="accent1"/>
+          </a:lnRef>
+          <a:fillRef idx="0">
+            <a:schemeClr val="accent1"/>
+          </a:fillRef>
+          <a:effectRef idx="0">
+            <a:schemeClr val="accent1"/>
+          </a:effectRef>
+          <a:fontRef idx="minor">
+            <a:schemeClr val="tx1"/>
+          </a:fontRef>
+        </p:style>
+      </p:cxnSp>
+      <p:cxnSp>
+        <p:nvCxnSpPr>
+          <p:cNvPr id="58" name="연결선: 꺾임 57">
+            <a:extLst>
+              <a:ext uri="{FF2B5EF4-FFF2-40B4-BE49-F238E27FC236}">
+                <a16:creationId xmlns:a16="http://schemas.microsoft.com/office/drawing/2014/main" id="{670E501F-83D9-4DBC-9350-0B1E51A90EC6}"/>
+              </a:ext>
+            </a:extLst>
+          </p:cNvPr>
+          <p:cNvCxnSpPr>
+            <a:cxnSpLocks/>
+            <a:stCxn id="13" idx="2"/>
+            <a:endCxn id="82" idx="3"/>
+          </p:cNvCxnSpPr>
+          <p:nvPr/>
+        </p:nvCxnSpPr>
+        <p:spPr>
+          <a:xfrm rot="5400000">
+            <a:off x="2879790" y="4723340"/>
+            <a:ext cx="2566667" cy="200810"/>
           </a:xfrm>
           <a:prstGeom prst="bentConnector2">
             <a:avLst/>
@@ -6244,13 +5963,630 @@
   <p:clrMapOvr>
     <a:masterClrMapping/>
   </p:clrMapOvr>
-  <p:timing>
-    <p:tnLst>
-      <p:par>
-        <p:cTn id="1" dur="indefinite" restart="never" nodeType="tmRoot"/>
-      </p:par>
-    </p:tnLst>
-  </p:timing>
+</p:sld>
+</file>
+
+<file path=ppt/slides/slide2.xml><?xml version="1.0" encoding="utf-8"?>
+<p:sld xmlns:a="http://schemas.openxmlformats.org/drawingml/2006/main" xmlns:r="http://schemas.openxmlformats.org/officeDocument/2006/relationships" xmlns:p="http://schemas.openxmlformats.org/presentationml/2006/main">
+  <p:cSld>
+    <p:spTree>
+      <p:nvGrpSpPr>
+        <p:cNvPr id="1" name=""/>
+        <p:cNvGrpSpPr/>
+        <p:nvPr/>
+      </p:nvGrpSpPr>
+      <p:grpSpPr>
+        <a:xfrm>
+          <a:off x="0" y="0"/>
+          <a:ext cx="0" cy="0"/>
+          <a:chOff x="0" y="0"/>
+          <a:chExt cx="0" cy="0"/>
+        </a:xfrm>
+      </p:grpSpPr>
+      <p:sp>
+        <p:nvSpPr>
+          <p:cNvPr id="5" name="직사각형 4"/>
+          <p:cNvSpPr/>
+          <p:nvPr/>
+        </p:nvSpPr>
+        <p:spPr>
+          <a:xfrm>
+            <a:off x="93785" y="630018"/>
+            <a:ext cx="5032131" cy="3970318"/>
+          </a:xfrm>
+          <a:prstGeom prst="rect">
+            <a:avLst/>
+          </a:prstGeom>
+        </p:spPr>
+        <p:txBody>
+          <a:bodyPr wrap="square">
+            <a:spAutoFit/>
+          </a:bodyPr>
+          <a:lstStyle/>
+          <a:p>
+            <a:r>
+              <a:rPr lang="ko-KR" altLang="en-US" dirty="0" err="1"/>
+              <a:t>rtc.conn</a:t>
+            </a:r>
+            <a:r>
+              <a:rPr lang="ko-KR" altLang="en-US" dirty="0"/>
+              <a:t> = {};</a:t>
+            </a:r>
+          </a:p>
+          <a:p>
+            <a:r>
+              <a:rPr lang="ko-KR" altLang="en-US" dirty="0" err="1"/>
+              <a:t>rtc.enables</a:t>
+            </a:r>
+            <a:r>
+              <a:rPr lang="ko-KR" altLang="en-US" dirty="0"/>
+              <a:t> = {};</a:t>
+            </a:r>
+          </a:p>
+          <a:p>
+            <a:r>
+              <a:rPr lang="ko-KR" altLang="en-US" dirty="0" err="1"/>
+              <a:t>rtc.streams</a:t>
+            </a:r>
+            <a:r>
+              <a:rPr lang="ko-KR" altLang="en-US" dirty="0"/>
+              <a:t> = {};</a:t>
+            </a:r>
+          </a:p>
+          <a:p>
+            <a:r>
+              <a:rPr lang="ko-KR" altLang="en-US" dirty="0" err="1"/>
+              <a:t>rtc.resolutionSelect</a:t>
+            </a:r>
+            <a:r>
+              <a:rPr lang="ko-KR" altLang="en-US" dirty="0"/>
+              <a:t> = {};</a:t>
+            </a:r>
+          </a:p>
+          <a:p>
+            <a:r>
+              <a:rPr lang="ko-KR" altLang="en-US" dirty="0" err="1"/>
+              <a:t>rtc.deviceSelect</a:t>
+            </a:r>
+            <a:r>
+              <a:rPr lang="ko-KR" altLang="en-US" dirty="0"/>
+              <a:t> = {};</a:t>
+            </a:r>
+          </a:p>
+          <a:p>
+            <a:r>
+              <a:rPr lang="ko-KR" altLang="en-US" dirty="0" err="1"/>
+              <a:t>rtc.permission</a:t>
+            </a:r>
+            <a:r>
+              <a:rPr lang="ko-KR" altLang="en-US" dirty="0"/>
+              <a:t> = {};</a:t>
+            </a:r>
+          </a:p>
+          <a:p>
+            <a:r>
+              <a:rPr lang="ko-KR" altLang="en-US" dirty="0" err="1"/>
+              <a:t>rtc.resolutions</a:t>
+            </a:r>
+            <a:r>
+              <a:rPr lang="ko-KR" altLang="en-US" dirty="0"/>
+              <a:t> = [LIST];</a:t>
+            </a:r>
+          </a:p>
+          <a:p>
+            <a:endParaRPr lang="ko-KR" altLang="en-US" dirty="0"/>
+          </a:p>
+          <a:p>
+            <a:r>
+              <a:rPr lang="ko-KR" altLang="en-US" dirty="0" err="1"/>
+              <a:t>setstream</a:t>
+            </a:r>
+            <a:r>
+              <a:rPr lang="ko-KR" altLang="en-US" dirty="0"/>
+              <a:t>(</a:t>
+            </a:r>
+            <a:r>
+              <a:rPr lang="ko-KR" altLang="en-US" dirty="0" err="1"/>
+              <a:t>event</a:t>
+            </a:r>
+            <a:r>
+              <a:rPr lang="ko-KR" altLang="en-US" dirty="0"/>
+              <a:t>);</a:t>
+            </a:r>
+          </a:p>
+          <a:p>
+            <a:r>
+              <a:rPr lang="ko-KR" altLang="en-US" dirty="0" err="1"/>
+              <a:t>onopen</a:t>
+            </a:r>
+            <a:r>
+              <a:rPr lang="ko-KR" altLang="en-US" dirty="0"/>
+              <a:t>(</a:t>
+            </a:r>
+            <a:r>
+              <a:rPr lang="ko-KR" altLang="en-US" dirty="0" err="1"/>
+              <a:t>event</a:t>
+            </a:r>
+            <a:r>
+              <a:rPr lang="ko-KR" altLang="en-US" dirty="0"/>
+              <a:t>);</a:t>
+            </a:r>
+          </a:p>
+          <a:p>
+            <a:r>
+              <a:rPr lang="ko-KR" altLang="en-US" dirty="0" err="1"/>
+              <a:t>onleave</a:t>
+            </a:r>
+            <a:r>
+              <a:rPr lang="ko-KR" altLang="en-US" dirty="0"/>
+              <a:t>(</a:t>
+            </a:r>
+            <a:r>
+              <a:rPr lang="ko-KR" altLang="en-US" dirty="0" err="1"/>
+              <a:t>event</a:t>
+            </a:r>
+            <a:r>
+              <a:rPr lang="ko-KR" altLang="en-US" dirty="0"/>
+              <a:t>);</a:t>
+            </a:r>
+          </a:p>
+          <a:p>
+            <a:r>
+              <a:rPr lang="ko-KR" altLang="en-US" dirty="0" err="1"/>
+              <a:t>onstreamended</a:t>
+            </a:r>
+            <a:r>
+              <a:rPr lang="ko-KR" altLang="en-US" dirty="0"/>
+              <a:t>(</a:t>
+            </a:r>
+            <a:r>
+              <a:rPr lang="ko-KR" altLang="en-US" dirty="0" err="1"/>
+              <a:t>event</a:t>
+            </a:r>
+            <a:r>
+              <a:rPr lang="ko-KR" altLang="en-US" dirty="0"/>
+              <a:t>);</a:t>
+            </a:r>
+          </a:p>
+          <a:p>
+            <a:r>
+              <a:rPr lang="ko-KR" altLang="en-US" dirty="0" err="1"/>
+              <a:t>onRoomFull</a:t>
+            </a:r>
+            <a:r>
+              <a:rPr lang="ko-KR" altLang="en-US" dirty="0"/>
+              <a:t>(</a:t>
+            </a:r>
+            <a:r>
+              <a:rPr lang="ko-KR" altLang="en-US" dirty="0" err="1"/>
+              <a:t>error</a:t>
+            </a:r>
+            <a:r>
+              <a:rPr lang="ko-KR" altLang="en-US" dirty="0"/>
+              <a:t>);</a:t>
+            </a:r>
+          </a:p>
+          <a:p>
+            <a:r>
+              <a:rPr lang="ko-KR" altLang="en-US" dirty="0" err="1"/>
+              <a:t>onUserIdAlreadyTaken</a:t>
+            </a:r>
+            <a:r>
+              <a:rPr lang="ko-KR" altLang="en-US" dirty="0"/>
+              <a:t>(</a:t>
+            </a:r>
+            <a:r>
+              <a:rPr lang="ko-KR" altLang="en-US" dirty="0" err="1"/>
+              <a:t>oldId</a:t>
+            </a:r>
+            <a:r>
+              <a:rPr lang="ko-KR" altLang="en-US" dirty="0"/>
+              <a:t>, </a:t>
+            </a:r>
+            <a:r>
+              <a:rPr lang="ko-KR" altLang="en-US" dirty="0" err="1"/>
+              <a:t>newId</a:t>
+            </a:r>
+            <a:r>
+              <a:rPr lang="ko-KR" altLang="en-US" dirty="0"/>
+              <a:t>);</a:t>
+            </a:r>
+          </a:p>
+        </p:txBody>
+      </p:sp>
+      <p:sp>
+        <p:nvSpPr>
+          <p:cNvPr id="7" name="직사각형 6"/>
+          <p:cNvSpPr/>
+          <p:nvPr/>
+        </p:nvSpPr>
+        <p:spPr>
+          <a:xfrm>
+            <a:off x="4621823" y="0"/>
+            <a:ext cx="6096000" cy="6186309"/>
+          </a:xfrm>
+          <a:prstGeom prst="rect">
+            <a:avLst/>
+          </a:prstGeom>
+        </p:spPr>
+        <p:txBody>
+          <a:bodyPr>
+            <a:spAutoFit/>
+          </a:bodyPr>
+          <a:lstStyle/>
+          <a:p>
+            <a:r>
+              <a:rPr lang="ko-KR" altLang="en-US" dirty="0" err="1"/>
+              <a:t>browserNotSupportErrorHandler</a:t>
+            </a:r>
+            <a:r>
+              <a:rPr lang="ko-KR" altLang="en-US" dirty="0"/>
+              <a:t>();</a:t>
+            </a:r>
+          </a:p>
+          <a:p>
+            <a:r>
+              <a:rPr lang="ko-KR" altLang="en-US" dirty="0" err="1"/>
+              <a:t>onBrowserNotSupportError</a:t>
+            </a:r>
+            <a:r>
+              <a:rPr lang="ko-KR" altLang="en-US" dirty="0"/>
+              <a:t>(</a:t>
+            </a:r>
+            <a:r>
+              <a:rPr lang="ko-KR" altLang="en-US" dirty="0" err="1"/>
+              <a:t>errors</a:t>
+            </a:r>
+            <a:r>
+              <a:rPr lang="ko-KR" altLang="en-US" dirty="0"/>
+              <a:t>);</a:t>
+            </a:r>
+          </a:p>
+          <a:p>
+            <a:endParaRPr lang="ko-KR" altLang="en-US" dirty="0"/>
+          </a:p>
+          <a:p>
+            <a:r>
+              <a:rPr lang="ko-KR" altLang="en-US" dirty="0" err="1"/>
+              <a:t>mediaCaptureErrorHandler</a:t>
+            </a:r>
+            <a:r>
+              <a:rPr lang="ko-KR" altLang="en-US" dirty="0"/>
+              <a:t>(</a:t>
+            </a:r>
+            <a:r>
+              <a:rPr lang="ko-KR" altLang="en-US" dirty="0" err="1"/>
+              <a:t>error</a:t>
+            </a:r>
+            <a:r>
+              <a:rPr lang="ko-KR" altLang="en-US" dirty="0"/>
+              <a:t>, </a:t>
+            </a:r>
+            <a:r>
+              <a:rPr lang="ko-KR" altLang="en-US" dirty="0" err="1"/>
+              <a:t>isAudio</a:t>
+            </a:r>
+            <a:r>
+              <a:rPr lang="ko-KR" altLang="en-US" dirty="0"/>
+              <a:t>);</a:t>
+            </a:r>
+          </a:p>
+          <a:p>
+            <a:r>
+              <a:rPr lang="ko-KR" altLang="en-US" dirty="0" err="1"/>
+              <a:t>onMediaCaptureError</a:t>
+            </a:r>
+            <a:r>
+              <a:rPr lang="ko-KR" altLang="en-US" dirty="0"/>
+              <a:t>(</a:t>
+            </a:r>
+            <a:r>
+              <a:rPr lang="ko-KR" altLang="en-US" dirty="0" err="1"/>
+              <a:t>error</a:t>
+            </a:r>
+            <a:r>
+              <a:rPr lang="ko-KR" altLang="en-US" dirty="0"/>
+              <a:t>, </a:t>
+            </a:r>
+            <a:r>
+              <a:rPr lang="ko-KR" altLang="en-US" dirty="0" err="1"/>
+              <a:t>isAudio</a:t>
+            </a:r>
+            <a:r>
+              <a:rPr lang="ko-KR" altLang="en-US" dirty="0"/>
+              <a:t>);</a:t>
+            </a:r>
+          </a:p>
+          <a:p>
+            <a:endParaRPr lang="ko-KR" altLang="en-US" dirty="0"/>
+          </a:p>
+          <a:p>
+            <a:r>
+              <a:rPr lang="ko-KR" altLang="en-US" dirty="0" err="1"/>
+              <a:t>openOrJoin</a:t>
+            </a:r>
+            <a:r>
+              <a:rPr lang="ko-KR" altLang="en-US" dirty="0"/>
+              <a:t>(</a:t>
+            </a:r>
+            <a:r>
+              <a:rPr lang="ko-KR" altLang="en-US" dirty="0" err="1"/>
+              <a:t>userId</a:t>
+            </a:r>
+            <a:r>
+              <a:rPr lang="ko-KR" altLang="en-US" dirty="0"/>
+              <a:t>, </a:t>
+            </a:r>
+            <a:r>
+              <a:rPr lang="ko-KR" altLang="en-US" dirty="0" err="1"/>
+              <a:t>roomId</a:t>
+            </a:r>
+            <a:r>
+              <a:rPr lang="ko-KR" altLang="en-US" dirty="0"/>
+              <a:t>);</a:t>
+            </a:r>
+          </a:p>
+          <a:p>
+            <a:r>
+              <a:rPr lang="ko-KR" altLang="en-US" dirty="0" err="1"/>
+              <a:t>beforeOpenOrJoin</a:t>
+            </a:r>
+            <a:r>
+              <a:rPr lang="ko-KR" altLang="en-US" dirty="0"/>
+              <a:t>(</a:t>
+            </a:r>
+            <a:r>
+              <a:rPr lang="ko-KR" altLang="en-US" dirty="0" err="1"/>
+              <a:t>callback</a:t>
+            </a:r>
+            <a:r>
+              <a:rPr lang="ko-KR" altLang="en-US" dirty="0"/>
+              <a:t>);</a:t>
+            </a:r>
+          </a:p>
+          <a:p>
+            <a:r>
+              <a:rPr lang="ko-KR" altLang="en-US" dirty="0" err="1"/>
+              <a:t>afterOpenOrJoin</a:t>
+            </a:r>
+            <a:r>
+              <a:rPr lang="ko-KR" altLang="en-US" dirty="0"/>
+              <a:t>(</a:t>
+            </a:r>
+            <a:r>
+              <a:rPr lang="ko-KR" altLang="en-US" dirty="0" err="1"/>
+              <a:t>stream</a:t>
+            </a:r>
+            <a:r>
+              <a:rPr lang="ko-KR" altLang="en-US" dirty="0"/>
+              <a:t>);</a:t>
+            </a:r>
+          </a:p>
+          <a:p>
+            <a:r>
+              <a:rPr lang="ko-KR" altLang="en-US" dirty="0" err="1"/>
+              <a:t>deviceSetting</a:t>
+            </a:r>
+            <a:r>
+              <a:rPr lang="ko-KR" altLang="en-US" dirty="0"/>
+              <a:t>(</a:t>
+            </a:r>
+            <a:r>
+              <a:rPr lang="ko-KR" altLang="en-US" dirty="0" err="1"/>
+              <a:t>stream</a:t>
+            </a:r>
+            <a:r>
+              <a:rPr lang="ko-KR" altLang="en-US" dirty="0"/>
+              <a:t>);</a:t>
+            </a:r>
+          </a:p>
+          <a:p>
+            <a:r>
+              <a:rPr lang="ko-KR" altLang="en-US" dirty="0" err="1"/>
+              <a:t>deviceChange</a:t>
+            </a:r>
+            <a:r>
+              <a:rPr lang="ko-KR" altLang="en-US" dirty="0"/>
+              <a:t>(</a:t>
+            </a:r>
+            <a:r>
+              <a:rPr lang="ko-KR" altLang="en-US" dirty="0" err="1"/>
+              <a:t>stream</a:t>
+            </a:r>
+            <a:r>
+              <a:rPr lang="ko-KR" altLang="en-US" dirty="0"/>
+              <a:t>, </a:t>
+            </a:r>
+            <a:r>
+              <a:rPr lang="ko-KR" altLang="en-US" dirty="0" err="1"/>
+              <a:t>deviceId</a:t>
+            </a:r>
+            <a:r>
+              <a:rPr lang="ko-KR" altLang="en-US" dirty="0"/>
+              <a:t>, </a:t>
+            </a:r>
+            <a:r>
+              <a:rPr lang="ko-KR" altLang="en-US" dirty="0" err="1"/>
+              <a:t>kind</a:t>
+            </a:r>
+            <a:r>
+              <a:rPr lang="ko-KR" altLang="en-US" dirty="0"/>
+              <a:t>);</a:t>
+            </a:r>
+          </a:p>
+          <a:p>
+            <a:r>
+              <a:rPr lang="ko-KR" altLang="en-US" dirty="0" err="1"/>
+              <a:t>resolutionSetting</a:t>
+            </a:r>
+            <a:r>
+              <a:rPr lang="ko-KR" altLang="en-US" dirty="0"/>
+              <a:t>(</a:t>
+            </a:r>
+            <a:r>
+              <a:rPr lang="ko-KR" altLang="en-US" dirty="0" err="1"/>
+              <a:t>stream</a:t>
+            </a:r>
+            <a:r>
+              <a:rPr lang="ko-KR" altLang="en-US" dirty="0"/>
+              <a:t>);</a:t>
+            </a:r>
+          </a:p>
+          <a:p>
+            <a:r>
+              <a:rPr lang="ko-KR" altLang="en-US" dirty="0" err="1"/>
+              <a:t>resolutionChange</a:t>
+            </a:r>
+            <a:r>
+              <a:rPr lang="ko-KR" altLang="en-US" dirty="0"/>
+              <a:t>(</a:t>
+            </a:r>
+            <a:r>
+              <a:rPr lang="ko-KR" altLang="en-US" dirty="0" err="1"/>
+              <a:t>stream</a:t>
+            </a:r>
+            <a:r>
+              <a:rPr lang="ko-KR" altLang="en-US" dirty="0"/>
+              <a:t>, </a:t>
+            </a:r>
+            <a:r>
+              <a:rPr lang="ko-KR" altLang="en-US" dirty="0" err="1"/>
+              <a:t>value</a:t>
+            </a:r>
+            <a:r>
+              <a:rPr lang="ko-KR" altLang="en-US" dirty="0"/>
+              <a:t>);</a:t>
+            </a:r>
+          </a:p>
+          <a:p>
+            <a:endParaRPr lang="ko-KR" altLang="en-US" dirty="0"/>
+          </a:p>
+          <a:p>
+            <a:r>
+              <a:rPr lang="ko-KR" altLang="en-US" dirty="0" err="1"/>
+              <a:t>RMCEventHandler</a:t>
+            </a:r>
+            <a:r>
+              <a:rPr lang="ko-KR" altLang="en-US" dirty="0"/>
+              <a:t>();</a:t>
+            </a:r>
+          </a:p>
+          <a:p>
+            <a:r>
+              <a:rPr lang="ko-KR" altLang="en-US" dirty="0" err="1"/>
+              <a:t>setContains</a:t>
+            </a:r>
+            <a:r>
+              <a:rPr lang="ko-KR" altLang="en-US" dirty="0"/>
+              <a:t>();</a:t>
+            </a:r>
+          </a:p>
+          <a:p>
+            <a:endParaRPr lang="ko-KR" altLang="en-US" dirty="0"/>
+          </a:p>
+          <a:p>
+            <a:r>
+              <a:rPr lang="ko-KR" altLang="en-US" dirty="0" err="1"/>
+              <a:t>getUserMedia</a:t>
+            </a:r>
+            <a:r>
+              <a:rPr lang="ko-KR" altLang="en-US" dirty="0"/>
+              <a:t>(</a:t>
+            </a:r>
+            <a:r>
+              <a:rPr lang="ko-KR" altLang="en-US" dirty="0" err="1"/>
+              <a:t>constraints</a:t>
+            </a:r>
+            <a:r>
+              <a:rPr lang="ko-KR" altLang="en-US" dirty="0"/>
+              <a:t>, </a:t>
+            </a:r>
+            <a:r>
+              <a:rPr lang="ko-KR" altLang="en-US" dirty="0" err="1"/>
+              <a:t>kind</a:t>
+            </a:r>
+            <a:r>
+              <a:rPr lang="ko-KR" altLang="en-US" dirty="0"/>
+              <a:t>, </a:t>
+            </a:r>
+            <a:r>
+              <a:rPr lang="ko-KR" altLang="en-US" dirty="0" err="1"/>
+              <a:t>callback</a:t>
+            </a:r>
+            <a:r>
+              <a:rPr lang="ko-KR" altLang="en-US" dirty="0"/>
+              <a:t>);</a:t>
+            </a:r>
+          </a:p>
+          <a:p>
+            <a:endParaRPr lang="ko-KR" altLang="en-US" dirty="0"/>
+          </a:p>
+          <a:p>
+            <a:r>
+              <a:rPr lang="ko-KR" altLang="en-US" dirty="0" err="1"/>
+              <a:t>onstream</a:t>
+            </a:r>
+            <a:r>
+              <a:rPr lang="ko-KR" altLang="en-US" dirty="0"/>
+              <a:t>(</a:t>
+            </a:r>
+            <a:r>
+              <a:rPr lang="ko-KR" altLang="en-US" dirty="0" err="1"/>
+              <a:t>event</a:t>
+            </a:r>
+            <a:r>
+              <a:rPr lang="ko-KR" altLang="en-US" dirty="0"/>
+              <a:t>);</a:t>
+            </a:r>
+          </a:p>
+          <a:p>
+            <a:r>
+              <a:rPr lang="ko-KR" altLang="en-US" dirty="0" err="1"/>
+              <a:t>ondevicesetting</a:t>
+            </a:r>
+            <a:r>
+              <a:rPr lang="ko-KR" altLang="en-US" dirty="0"/>
+              <a:t>(</a:t>
+            </a:r>
+            <a:r>
+              <a:rPr lang="ko-KR" altLang="en-US" dirty="0" err="1"/>
+              <a:t>event</a:t>
+            </a:r>
+            <a:r>
+              <a:rPr lang="ko-KR" altLang="en-US" dirty="0"/>
+              <a:t>);</a:t>
+            </a:r>
+          </a:p>
+          <a:p>
+            <a:r>
+              <a:rPr lang="ko-KR" altLang="en-US" dirty="0" err="1"/>
+              <a:t>onresolutionsetting</a:t>
+            </a:r>
+            <a:r>
+              <a:rPr lang="ko-KR" altLang="en-US" dirty="0"/>
+              <a:t>(</a:t>
+            </a:r>
+            <a:r>
+              <a:rPr lang="ko-KR" altLang="en-US" dirty="0" err="1"/>
+              <a:t>event</a:t>
+            </a:r>
+            <a:r>
+              <a:rPr lang="ko-KR" altLang="en-US" dirty="0"/>
+              <a:t>);</a:t>
+            </a:r>
+          </a:p>
+        </p:txBody>
+      </p:sp>
+    </p:spTree>
+    <p:extLst>
+      <p:ext uri="{BB962C8B-B14F-4D97-AF65-F5344CB8AC3E}">
+        <p14:creationId xmlns:p14="http://schemas.microsoft.com/office/powerpoint/2010/main" val="4010574434"/>
+      </p:ext>
+    </p:extLst>
+  </p:cSld>
+  <p:clrMapOvr>
+    <a:masterClrMapping/>
+  </p:clrMapOvr>
 </p:sld>
 </file>
 

</xml_diff>